<commit_message>
Atualiza aula 03 - ASP.NET
</commit_message>
<xml_diff>
--- a/asp.net/aula03/aula03.pptx
+++ b/asp.net/aula03/aula03.pptx
@@ -12,16 +12,16 @@
     <p:sldId id="412" r:id="rId3"/>
     <p:sldId id="413" r:id="rId4"/>
     <p:sldId id="439" r:id="rId5"/>
-    <p:sldId id="441" r:id="rId6"/>
-    <p:sldId id="440" r:id="rId7"/>
-    <p:sldId id="418" r:id="rId8"/>
-    <p:sldId id="419" r:id="rId9"/>
-    <p:sldId id="432" r:id="rId10"/>
-    <p:sldId id="433" r:id="rId11"/>
-    <p:sldId id="443" r:id="rId12"/>
-    <p:sldId id="444" r:id="rId13"/>
-    <p:sldId id="435" r:id="rId14"/>
-    <p:sldId id="425" r:id="rId15"/>
+    <p:sldId id="440" r:id="rId6"/>
+    <p:sldId id="418" r:id="rId7"/>
+    <p:sldId id="419" r:id="rId8"/>
+    <p:sldId id="432" r:id="rId9"/>
+    <p:sldId id="433" r:id="rId10"/>
+    <p:sldId id="443" r:id="rId11"/>
+    <p:sldId id="444" r:id="rId12"/>
+    <p:sldId id="435" r:id="rId13"/>
+    <p:sldId id="425" r:id="rId14"/>
+    <p:sldId id="445" r:id="rId15"/>
     <p:sldId id="442" r:id="rId16"/>
   </p:sldIdLst>
   <p:sldSz cx="12192000" cy="6858000"/>
@@ -214,7 +214,7 @@
           <a:p>
             <a:fld id="{4ECBB736-8313-4D19-B776-1A171911D8B8}" type="datetimeFigureOut">
               <a:rPr lang="pt-BR" smtClean="0"/>
-              <a:t>16/12/2015</a:t>
+              <a:t>05/01/2016</a:t>
             </a:fld>
             <a:endParaRPr lang="pt-BR"/>
           </a:p>
@@ -735,10 +735,6 @@
               <a:buFont typeface="Arial"/>
               <a:buNone/>
             </a:pPr>
-            <a:r>
-              <a:rPr lang="pt-BR" sz="1800" b="0" i="0" u="none" strike="noStrike" cap="none" baseline="0" dirty="0" smtClean="0"/>
-              <a:t>Explicar como pegar elementos individuais.</a:t>
-            </a:r>
             <a:endParaRPr sz="1800" b="0" i="0" u="none" strike="noStrike" cap="none" baseline="0" dirty="0"/>
           </a:p>
         </p:txBody>
@@ -1155,6 +1151,127 @@
     </p:spTree>
     <p:extLst>
       <p:ext uri="{BB962C8B-B14F-4D97-AF65-F5344CB8AC3E}">
+        <p14:creationId xmlns:p14="http://schemas.microsoft.com/office/powerpoint/2010/main" val="3122039286"/>
+      </p:ext>
+    </p:extLst>
+  </p:cSld>
+  <p:clrMapOvr>
+    <a:masterClrMapping/>
+  </p:clrMapOvr>
+</p:notes>
+</file>
+
+<file path=ppt/notesSlides/notesSlide15.xml><?xml version="1.0" encoding="utf-8"?>
+<p:notes xmlns:a="http://schemas.openxmlformats.org/drawingml/2006/main" xmlns:r="http://schemas.openxmlformats.org/officeDocument/2006/relationships" xmlns:p="http://schemas.openxmlformats.org/presentationml/2006/main" showMasterSp="0" showMasterPhAnim="0">
+  <p:cSld>
+    <p:spTree>
+      <p:nvGrpSpPr>
+        <p:cNvPr id="1" name="Shape 339"/>
+        <p:cNvGrpSpPr/>
+        <p:nvPr/>
+      </p:nvGrpSpPr>
+      <p:grpSpPr>
+        <a:xfrm>
+          <a:off x="0" y="0"/>
+          <a:ext cx="0" cy="0"/>
+          <a:chOff x="0" y="0"/>
+          <a:chExt cx="0" cy="0"/>
+        </a:xfrm>
+      </p:grpSpPr>
+      <p:sp>
+        <p:nvSpPr>
+          <p:cNvPr id="340" name="Shape 340"/>
+          <p:cNvSpPr txBox="1">
+            <a:spLocks noGrp="1"/>
+          </p:cNvSpPr>
+          <p:nvPr>
+            <p:ph type="body" idx="1"/>
+          </p:nvPr>
+        </p:nvSpPr>
+        <p:spPr>
+          <a:xfrm>
+            <a:off x="685800" y="4400550"/>
+            <a:ext cx="5486399" cy="3600599"/>
+          </a:xfrm>
+          <a:prstGeom prst="rect">
+            <a:avLst/>
+          </a:prstGeom>
+          <a:noFill/>
+          <a:ln>
+            <a:noFill/>
+          </a:ln>
+        </p:spPr>
+        <p:txBody>
+          <a:bodyPr lIns="91425" tIns="91425" rIns="91425" bIns="91425" anchor="t" anchorCtr="0">
+            <a:noAutofit/>
+          </a:bodyPr>
+          <a:lstStyle/>
+          <a:p>
+            <a:pPr marL="0" marR="0" lvl="0" indent="0" algn="l" rtl="0">
+              <a:spcBef>
+                <a:spcPts val="0"/>
+              </a:spcBef>
+              <a:buFont typeface="Arial"/>
+              <a:buNone/>
+            </a:pPr>
+            <a:endParaRPr sz="1800" b="0" i="0" u="none" strike="noStrike" cap="none" baseline="0"/>
+          </a:p>
+        </p:txBody>
+      </p:sp>
+      <p:sp>
+        <p:nvSpPr>
+          <p:cNvPr id="341" name="Shape 341"/>
+          <p:cNvSpPr>
+            <a:spLocks noGrp="1" noRot="1" noChangeAspect="1"/>
+          </p:cNvSpPr>
+          <p:nvPr>
+            <p:ph type="sldImg" idx="2"/>
+          </p:nvPr>
+        </p:nvSpPr>
+        <p:spPr>
+          <a:xfrm>
+            <a:off x="685800" y="1143000"/>
+            <a:ext cx="5486400" cy="3086100"/>
+          </a:xfrm>
+          <a:custGeom>
+            <a:avLst/>
+            <a:gdLst/>
+            <a:ahLst/>
+            <a:cxnLst/>
+            <a:rect l="0" t="0" r="0" b="0"/>
+            <a:pathLst>
+              <a:path w="120000" h="120000" extrusionOk="0">
+                <a:moveTo>
+                  <a:pt x="0" y="0"/>
+                </a:moveTo>
+                <a:lnTo>
+                  <a:pt x="120000" y="0"/>
+                </a:lnTo>
+                <a:lnTo>
+                  <a:pt x="120000" y="120000"/>
+                </a:lnTo>
+                <a:lnTo>
+                  <a:pt x="0" y="120000"/>
+                </a:lnTo>
+                <a:close/>
+              </a:path>
+            </a:pathLst>
+          </a:custGeom>
+          <a:noFill/>
+          <a:ln w="9525" cap="flat">
+            <a:solidFill>
+              <a:srgbClr val="000000"/>
+            </a:solidFill>
+            <a:prstDash val="solid"/>
+            <a:round/>
+            <a:headEnd type="none" w="med" len="med"/>
+            <a:tailEnd type="none" w="med" len="med"/>
+          </a:ln>
+        </p:spPr>
+      </p:sp>
+    </p:spTree>
+    <p:extLst>
+      <p:ext uri="{BB962C8B-B14F-4D97-AF65-F5344CB8AC3E}">
         <p14:creationId xmlns:p14="http://schemas.microsoft.com/office/powerpoint/2010/main" val="4206091128"/>
       </p:ext>
     </p:extLst>
@@ -2263,7 +2380,7 @@
           <a:p>
             <a:fld id="{3A39DBC5-2C38-48A3-B992-E685F3AC53B2}" type="datetime1">
               <a:rPr lang="pt-BR" smtClean="0"/>
-              <a:t>16/12/2015</a:t>
+              <a:t>05/01/2016</a:t>
             </a:fld>
             <a:endParaRPr lang="pt-BR"/>
           </a:p>
@@ -2433,7 +2550,7 @@
           <a:p>
             <a:fld id="{2AAE39F9-674E-44E2-8392-020201F179FD}" type="datetime1">
               <a:rPr lang="pt-BR" smtClean="0"/>
-              <a:t>16/12/2015</a:t>
+              <a:t>05/01/2016</a:t>
             </a:fld>
             <a:endParaRPr lang="pt-BR"/>
           </a:p>
@@ -2613,7 +2730,7 @@
           <a:p>
             <a:fld id="{1BCC817A-A7E8-4D3C-9605-6F40C5FA9D4F}" type="datetime1">
               <a:rPr lang="pt-BR" smtClean="0"/>
-              <a:t>16/12/2015</a:t>
+              <a:t>05/01/2016</a:t>
             </a:fld>
             <a:endParaRPr lang="pt-BR"/>
           </a:p>
@@ -2982,7 +3099,7 @@
           <a:p>
             <a:fld id="{9137BABC-AB5D-42E5-B0D8-C31C9002C668}" type="datetime1">
               <a:rPr lang="pt-BR" smtClean="0"/>
-              <a:t>16/12/2015</a:t>
+              <a:t>05/01/2016</a:t>
             </a:fld>
             <a:endParaRPr lang="pt-BR"/>
           </a:p>
@@ -3228,7 +3345,7 @@
           <a:p>
             <a:fld id="{6E757F80-A13A-4310-9A69-908998C8C2C5}" type="datetime1">
               <a:rPr lang="pt-BR" smtClean="0"/>
-              <a:t>16/12/2015</a:t>
+              <a:t>05/01/2016</a:t>
             </a:fld>
             <a:endParaRPr lang="pt-BR"/>
           </a:p>
@@ -3460,7 +3577,7 @@
           <a:p>
             <a:fld id="{C5AB606D-4394-45E7-A78B-50D1C3EED2FB}" type="datetime1">
               <a:rPr lang="pt-BR" smtClean="0"/>
-              <a:t>16/12/2015</a:t>
+              <a:t>05/01/2016</a:t>
             </a:fld>
             <a:endParaRPr lang="pt-BR"/>
           </a:p>
@@ -3827,7 +3944,7 @@
           <a:p>
             <a:fld id="{6AC7EE90-1072-42BF-B725-B8939EB93CDB}" type="datetime1">
               <a:rPr lang="pt-BR" smtClean="0"/>
-              <a:t>16/12/2015</a:t>
+              <a:t>05/01/2016</a:t>
             </a:fld>
             <a:endParaRPr lang="pt-BR"/>
           </a:p>
@@ -3945,7 +4062,7 @@
           <a:p>
             <a:fld id="{C3959479-E752-4162-999B-71C3505BE0BA}" type="datetime1">
               <a:rPr lang="pt-BR" smtClean="0"/>
-              <a:t>16/12/2015</a:t>
+              <a:t>05/01/2016</a:t>
             </a:fld>
             <a:endParaRPr lang="pt-BR"/>
           </a:p>
@@ -4040,7 +4157,7 @@
           <a:p>
             <a:fld id="{12CC2762-9DEB-433B-BF30-64845B11E136}" type="datetime1">
               <a:rPr lang="pt-BR" smtClean="0"/>
-              <a:t>16/12/2015</a:t>
+              <a:t>05/01/2016</a:t>
             </a:fld>
             <a:endParaRPr lang="pt-BR"/>
           </a:p>
@@ -4317,7 +4434,7 @@
           <a:p>
             <a:fld id="{778C9173-2F95-4B2A-97F4-1662ABFF28F0}" type="datetime1">
               <a:rPr lang="pt-BR" smtClean="0"/>
-              <a:t>16/12/2015</a:t>
+              <a:t>05/01/2016</a:t>
             </a:fld>
             <a:endParaRPr lang="pt-BR"/>
           </a:p>
@@ -4570,7 +4687,7 @@
           <a:p>
             <a:fld id="{34D65441-79CE-4AA3-BC19-F4F589736C75}" type="datetime1">
               <a:rPr lang="pt-BR" smtClean="0"/>
-              <a:t>16/12/2015</a:t>
+              <a:t>05/01/2016</a:t>
             </a:fld>
             <a:endParaRPr lang="pt-BR"/>
           </a:p>
@@ -4783,7 +4900,7 @@
           <a:p>
             <a:fld id="{46FEF5E6-E9BF-448C-AF0E-9756000CB479}" type="datetime1">
               <a:rPr lang="pt-BR" smtClean="0"/>
-              <a:t>16/12/2015</a:t>
+              <a:t>05/01/2016</a:t>
             </a:fld>
             <a:endParaRPr lang="pt-BR"/>
           </a:p>
@@ -5513,7 +5630,7 @@
                 <a:latin typeface="Segoe UI Light" panose="020B0502040204020203" pitchFamily="34" charset="0"/>
                 <a:cs typeface="Segoe UI Light" panose="020B0502040204020203" pitchFamily="34" charset="0"/>
               </a:rPr>
-              <a:t>), e tratamento de erros</a:t>
+              <a:t>), Utilidades, e tratamento de erros</a:t>
             </a:r>
             <a:endParaRPr lang="pt-BR" dirty="0" smtClean="0">
               <a:solidFill>
@@ -5560,1030 +5677,6 @@
 </file>
 
 <file path=ppt/slides/slide10.xml><?xml version="1.0" encoding="utf-8"?>
-<p:sld xmlns:a="http://schemas.openxmlformats.org/drawingml/2006/main" xmlns:r="http://schemas.openxmlformats.org/officeDocument/2006/relationships" xmlns:p="http://schemas.openxmlformats.org/presentationml/2006/main">
-  <p:cSld>
-    <p:spTree>
-      <p:nvGrpSpPr>
-        <p:cNvPr id="1" name="Shape 232"/>
-        <p:cNvGrpSpPr/>
-        <p:nvPr/>
-      </p:nvGrpSpPr>
-      <p:grpSpPr>
-        <a:xfrm>
-          <a:off x="0" y="0"/>
-          <a:ext cx="0" cy="0"/>
-          <a:chOff x="0" y="0"/>
-          <a:chExt cx="0" cy="0"/>
-        </a:xfrm>
-      </p:grpSpPr>
-      <p:sp>
-        <p:nvSpPr>
-          <p:cNvPr id="8" name="Shape 494"/>
-          <p:cNvSpPr txBox="1">
-            <a:spLocks/>
-          </p:cNvSpPr>
-          <p:nvPr/>
-        </p:nvSpPr>
-        <p:spPr>
-          <a:xfrm>
-            <a:off x="0" y="0"/>
-            <a:ext cx="12191999" cy="979136"/>
-          </a:xfrm>
-          <a:prstGeom prst="rect">
-            <a:avLst/>
-          </a:prstGeom>
-          <a:solidFill>
-            <a:srgbClr val="008272"/>
-          </a:solidFill>
-          <a:ln>
-            <a:noFill/>
-          </a:ln>
-        </p:spPr>
-        <p:txBody>
-          <a:bodyPr lIns="0" tIns="0" rIns="0" bIns="0" anchor="ctr" anchorCtr="0">
-            <a:noAutofit/>
-          </a:bodyPr>
-          <a:lstStyle>
-            <a:defPPr marR="0" algn="l" rtl="0">
-              <a:lnSpc>
-                <a:spcPct val="100000"/>
-              </a:lnSpc>
-              <a:spcBef>
-                <a:spcPts val="0"/>
-              </a:spcBef>
-              <a:spcAft>
-                <a:spcPts val="0"/>
-              </a:spcAft>
-            </a:defPPr>
-            <a:lvl1pPr marL="0" marR="0" indent="0" algn="l" rtl="0">
-              <a:lnSpc>
-                <a:spcPct val="90000"/>
-              </a:lnSpc>
-              <a:spcBef>
-                <a:spcPts val="0"/>
-              </a:spcBef>
-              <a:spcAft>
-                <a:spcPts val="0"/>
-              </a:spcAft>
-              <a:buClr>
-                <a:schemeClr val="dk1"/>
-              </a:buClr>
-              <a:buFont typeface="Quattrocento Sans"/>
-              <a:buNone/>
-              <a:defRPr sz="1400" b="0" i="0" u="none" strike="noStrike" cap="none" baseline="0">
-                <a:solidFill>
-                  <a:srgbClr val="000000"/>
-                </a:solidFill>
-                <a:latin typeface="Arial"/>
-                <a:ea typeface="Arial"/>
-                <a:cs typeface="Arial"/>
-                <a:sym typeface="Arial"/>
-                <a:rtl val="0"/>
-              </a:defRPr>
-            </a:lvl1pPr>
-            <a:lvl2pPr marL="0" marR="0" indent="0" algn="l" rtl="0">
-              <a:lnSpc>
-                <a:spcPct val="100000"/>
-              </a:lnSpc>
-              <a:spcBef>
-                <a:spcPts val="0"/>
-              </a:spcBef>
-              <a:spcAft>
-                <a:spcPts val="0"/>
-              </a:spcAft>
-              <a:buNone/>
-              <a:defRPr sz="1400" b="0" i="0" u="none" strike="noStrike" cap="none" baseline="0">
-                <a:solidFill>
-                  <a:srgbClr val="000000"/>
-                </a:solidFill>
-                <a:latin typeface="Arial"/>
-                <a:ea typeface="Arial"/>
-                <a:cs typeface="Arial"/>
-                <a:sym typeface="Arial"/>
-                <a:rtl val="0"/>
-              </a:defRPr>
-            </a:lvl2pPr>
-            <a:lvl3pPr marL="0" marR="0" indent="0" algn="l" rtl="0">
-              <a:spcBef>
-                <a:spcPts val="0"/>
-              </a:spcBef>
-              <a:defRPr/>
-            </a:lvl3pPr>
-            <a:lvl4pPr marL="0" marR="0" indent="0" algn="l" rtl="0">
-              <a:spcBef>
-                <a:spcPts val="0"/>
-              </a:spcBef>
-              <a:defRPr/>
-            </a:lvl4pPr>
-            <a:lvl5pPr marL="0" marR="0" indent="0" algn="l" rtl="0">
-              <a:spcBef>
-                <a:spcPts val="0"/>
-              </a:spcBef>
-              <a:defRPr/>
-            </a:lvl5pPr>
-            <a:lvl6pPr marL="0" marR="0" indent="0" algn="l" rtl="0">
-              <a:spcBef>
-                <a:spcPts val="0"/>
-              </a:spcBef>
-              <a:defRPr/>
-            </a:lvl6pPr>
-            <a:lvl7pPr marL="0" marR="0" indent="0" algn="l" rtl="0">
-              <a:spcBef>
-                <a:spcPts val="0"/>
-              </a:spcBef>
-              <a:defRPr/>
-            </a:lvl7pPr>
-            <a:lvl8pPr marL="0" marR="0" indent="0" algn="l" rtl="0">
-              <a:spcBef>
-                <a:spcPts val="0"/>
-              </a:spcBef>
-              <a:defRPr/>
-            </a:lvl8pPr>
-            <a:lvl9pPr marL="0" marR="0" indent="0" algn="l" rtl="0">
-              <a:spcBef>
-                <a:spcPts val="0"/>
-              </a:spcBef>
-              <a:defRPr/>
-            </a:lvl9pPr>
-          </a:lstStyle>
-          <a:p>
-            <a:pPr marL="360000">
-              <a:buClr>
-                <a:srgbClr val="68217A"/>
-              </a:buClr>
-              <a:buSzPct val="25000"/>
-            </a:pPr>
-            <a:r>
-              <a:rPr lang="en-US" sz="3600" dirty="0" err="1" smtClean="0">
-                <a:solidFill>
-                  <a:schemeClr val="bg1"/>
-                </a:solidFill>
-                <a:latin typeface="Segoe UI Light" panose="020B0502040204020203" pitchFamily="34" charset="0"/>
-                <a:ea typeface="Quattrocento Sans"/>
-                <a:cs typeface="Segoe UI Light" panose="020B0502040204020203" pitchFamily="34" charset="0"/>
-              </a:rPr>
-              <a:t>Lista</a:t>
-            </a:r>
-            <a:endParaRPr lang="en-US" sz="3600" kern="0" dirty="0">
-              <a:solidFill>
-                <a:schemeClr val="bg1"/>
-              </a:solidFill>
-              <a:latin typeface="Segoe UI Light" panose="020B0502040204020203" pitchFamily="34" charset="0"/>
-              <a:ea typeface="Quattrocento Sans"/>
-              <a:cs typeface="Segoe UI Light" panose="020B0502040204020203" pitchFamily="34" charset="0"/>
-              <a:sym typeface="Quattrocento Sans"/>
-            </a:endParaRPr>
-          </a:p>
-        </p:txBody>
-      </p:sp>
-      <p:sp>
-        <p:nvSpPr>
-          <p:cNvPr id="3" name="Rectangle 3"/>
-          <p:cNvSpPr txBox="1">
-            <a:spLocks noChangeArrowheads="1"/>
-          </p:cNvSpPr>
-          <p:nvPr/>
-        </p:nvSpPr>
-        <p:spPr>
-          <a:xfrm>
-            <a:off x="457200" y="1143000"/>
-            <a:ext cx="11455400" cy="5105400"/>
-          </a:xfrm>
-          <a:prstGeom prst="rect">
-            <a:avLst/>
-          </a:prstGeom>
-        </p:spPr>
-        <p:txBody>
-          <a:bodyPr/>
-          <a:lstStyle>
-            <a:defPPr marR="0" algn="l" rtl="0">
-              <a:lnSpc>
-                <a:spcPct val="100000"/>
-              </a:lnSpc>
-              <a:spcBef>
-                <a:spcPts val="0"/>
-              </a:spcBef>
-              <a:spcAft>
-                <a:spcPts val="0"/>
-              </a:spcAft>
-            </a:defPPr>
-            <a:lvl1pPr marR="0" algn="l" rtl="0">
-              <a:lnSpc>
-                <a:spcPct val="100000"/>
-              </a:lnSpc>
-              <a:spcBef>
-                <a:spcPts val="0"/>
-              </a:spcBef>
-              <a:spcAft>
-                <a:spcPts val="0"/>
-              </a:spcAft>
-              <a:buNone/>
-              <a:defRPr sz="1400" b="0" i="0" u="none" strike="noStrike" cap="none" baseline="0">
-                <a:solidFill>
-                  <a:srgbClr val="000000"/>
-                </a:solidFill>
-                <a:latin typeface="Arial"/>
-                <a:ea typeface="Arial"/>
-                <a:cs typeface="Arial"/>
-                <a:sym typeface="Arial"/>
-                <a:rtl val="0"/>
-              </a:defRPr>
-            </a:lvl1pPr>
-            <a:lvl2pPr marR="0" algn="l" rtl="0">
-              <a:lnSpc>
-                <a:spcPct val="100000"/>
-              </a:lnSpc>
-              <a:spcBef>
-                <a:spcPts val="0"/>
-              </a:spcBef>
-              <a:spcAft>
-                <a:spcPts val="0"/>
-              </a:spcAft>
-              <a:buNone/>
-              <a:defRPr sz="1400" b="0" i="0" u="none" strike="noStrike" cap="none" baseline="0">
-                <a:solidFill>
-                  <a:srgbClr val="000000"/>
-                </a:solidFill>
-                <a:latin typeface="Arial"/>
-                <a:ea typeface="Arial"/>
-                <a:cs typeface="Arial"/>
-                <a:sym typeface="Arial"/>
-                <a:rtl val="0"/>
-              </a:defRPr>
-            </a:lvl2pPr>
-            <a:lvl3pPr marR="0" algn="l" rtl="0">
-              <a:lnSpc>
-                <a:spcPct val="100000"/>
-              </a:lnSpc>
-              <a:spcBef>
-                <a:spcPts val="0"/>
-              </a:spcBef>
-              <a:spcAft>
-                <a:spcPts val="0"/>
-              </a:spcAft>
-              <a:buNone/>
-              <a:defRPr sz="1400" b="0" i="0" u="none" strike="noStrike" cap="none" baseline="0">
-                <a:solidFill>
-                  <a:srgbClr val="000000"/>
-                </a:solidFill>
-                <a:latin typeface="Arial"/>
-                <a:ea typeface="Arial"/>
-                <a:cs typeface="Arial"/>
-                <a:sym typeface="Arial"/>
-                <a:rtl val="0"/>
-              </a:defRPr>
-            </a:lvl3pPr>
-            <a:lvl4pPr marR="0" algn="l" rtl="0">
-              <a:lnSpc>
-                <a:spcPct val="100000"/>
-              </a:lnSpc>
-              <a:spcBef>
-                <a:spcPts val="0"/>
-              </a:spcBef>
-              <a:spcAft>
-                <a:spcPts val="0"/>
-              </a:spcAft>
-              <a:buNone/>
-              <a:defRPr sz="1400" b="0" i="0" u="none" strike="noStrike" cap="none" baseline="0">
-                <a:solidFill>
-                  <a:srgbClr val="000000"/>
-                </a:solidFill>
-                <a:latin typeface="Arial"/>
-                <a:ea typeface="Arial"/>
-                <a:cs typeface="Arial"/>
-                <a:sym typeface="Arial"/>
-                <a:rtl val="0"/>
-              </a:defRPr>
-            </a:lvl4pPr>
-            <a:lvl5pPr marR="0" algn="l" rtl="0">
-              <a:lnSpc>
-                <a:spcPct val="100000"/>
-              </a:lnSpc>
-              <a:spcBef>
-                <a:spcPts val="0"/>
-              </a:spcBef>
-              <a:spcAft>
-                <a:spcPts val="0"/>
-              </a:spcAft>
-              <a:buNone/>
-              <a:defRPr sz="1400" b="0" i="0" u="none" strike="noStrike" cap="none" baseline="0">
-                <a:solidFill>
-                  <a:srgbClr val="000000"/>
-                </a:solidFill>
-                <a:latin typeface="Arial"/>
-                <a:ea typeface="Arial"/>
-                <a:cs typeface="Arial"/>
-                <a:sym typeface="Arial"/>
-                <a:rtl val="0"/>
-              </a:defRPr>
-            </a:lvl5pPr>
-            <a:lvl6pPr marR="0" algn="l" rtl="0">
-              <a:lnSpc>
-                <a:spcPct val="100000"/>
-              </a:lnSpc>
-              <a:spcBef>
-                <a:spcPts val="0"/>
-              </a:spcBef>
-              <a:spcAft>
-                <a:spcPts val="0"/>
-              </a:spcAft>
-              <a:buNone/>
-              <a:defRPr sz="1400" b="0" i="0" u="none" strike="noStrike" cap="none" baseline="0">
-                <a:solidFill>
-                  <a:srgbClr val="000000"/>
-                </a:solidFill>
-                <a:latin typeface="Arial"/>
-                <a:ea typeface="Arial"/>
-                <a:cs typeface="Arial"/>
-                <a:sym typeface="Arial"/>
-                <a:rtl val="0"/>
-              </a:defRPr>
-            </a:lvl6pPr>
-            <a:lvl7pPr marR="0" algn="l" rtl="0">
-              <a:lnSpc>
-                <a:spcPct val="100000"/>
-              </a:lnSpc>
-              <a:spcBef>
-                <a:spcPts val="0"/>
-              </a:spcBef>
-              <a:spcAft>
-                <a:spcPts val="0"/>
-              </a:spcAft>
-              <a:buNone/>
-              <a:defRPr sz="1400" b="0" i="0" u="none" strike="noStrike" cap="none" baseline="0">
-                <a:solidFill>
-                  <a:srgbClr val="000000"/>
-                </a:solidFill>
-                <a:latin typeface="Arial"/>
-                <a:ea typeface="Arial"/>
-                <a:cs typeface="Arial"/>
-                <a:sym typeface="Arial"/>
-                <a:rtl val="0"/>
-              </a:defRPr>
-            </a:lvl7pPr>
-            <a:lvl8pPr marR="0" algn="l" rtl="0">
-              <a:lnSpc>
-                <a:spcPct val="100000"/>
-              </a:lnSpc>
-              <a:spcBef>
-                <a:spcPts val="0"/>
-              </a:spcBef>
-              <a:spcAft>
-                <a:spcPts val="0"/>
-              </a:spcAft>
-              <a:buNone/>
-              <a:defRPr sz="1400" b="0" i="0" u="none" strike="noStrike" cap="none" baseline="0">
-                <a:solidFill>
-                  <a:srgbClr val="000000"/>
-                </a:solidFill>
-                <a:latin typeface="Arial"/>
-                <a:ea typeface="Arial"/>
-                <a:cs typeface="Arial"/>
-                <a:sym typeface="Arial"/>
-                <a:rtl val="0"/>
-              </a:defRPr>
-            </a:lvl8pPr>
-            <a:lvl9pPr marR="0" algn="l" rtl="0">
-              <a:lnSpc>
-                <a:spcPct val="100000"/>
-              </a:lnSpc>
-              <a:spcBef>
-                <a:spcPts val="0"/>
-              </a:spcBef>
-              <a:spcAft>
-                <a:spcPts val="0"/>
-              </a:spcAft>
-              <a:buNone/>
-              <a:defRPr sz="1400" b="0" i="0" u="none" strike="noStrike" cap="none" baseline="0">
-                <a:solidFill>
-                  <a:srgbClr val="000000"/>
-                </a:solidFill>
-                <a:latin typeface="Arial"/>
-                <a:ea typeface="Arial"/>
-                <a:cs typeface="Arial"/>
-                <a:sym typeface="Arial"/>
-                <a:rtl val="0"/>
-              </a:defRPr>
-            </a:lvl9pPr>
-          </a:lstStyle>
-          <a:p>
-            <a:pPr marL="571500" indent="-571500">
-              <a:buFont typeface="Arial" panose="020B0604020202020204" pitchFamily="34" charset="0"/>
-              <a:buChar char="•"/>
-            </a:pPr>
-            <a:r>
-              <a:rPr lang="pt-BR" altLang="pt-BR" sz="2400" kern="0" dirty="0" smtClean="0">
-                <a:latin typeface="Segoe UI Light" panose="020B0502040204020203" pitchFamily="34" charset="0"/>
-                <a:cs typeface="Segoe UI Light" panose="020B0502040204020203" pitchFamily="34" charset="0"/>
-              </a:rPr>
-              <a:t>Listas são um pouco mais flexíveis que vetores. </a:t>
-            </a:r>
-            <a:r>
-              <a:rPr lang="pt-BR" altLang="pt-BR" sz="2400" kern="0" dirty="0" smtClean="0">
-                <a:latin typeface="Segoe UI Light" panose="020B0502040204020203" pitchFamily="34" charset="0"/>
-                <a:cs typeface="Segoe UI Light" panose="020B0502040204020203" pitchFamily="34" charset="0"/>
-              </a:rPr>
-              <a:t>Ao contrário de vetores, listas não precisam que um tamanho limite seja especificado ao definí-las.</a:t>
-            </a:r>
-          </a:p>
-          <a:p>
-            <a:pPr marL="571500" indent="-571500">
-              <a:buFont typeface="Arial" panose="020B0604020202020204" pitchFamily="34" charset="0"/>
-              <a:buChar char="•"/>
-            </a:pPr>
-            <a:endParaRPr lang="pt-BR" altLang="pt-BR" sz="2400" kern="0" dirty="0" smtClean="0">
-              <a:latin typeface="Segoe UI Light" panose="020B0502040204020203" pitchFamily="34" charset="0"/>
-              <a:cs typeface="Segoe UI Light" panose="020B0502040204020203" pitchFamily="34" charset="0"/>
-            </a:endParaRPr>
-          </a:p>
-          <a:p>
-            <a:r>
-              <a:rPr lang="en-US" sz="2400" dirty="0">
-                <a:highlight>
-                  <a:srgbClr val="FFFFFF"/>
-                </a:highlight>
-                <a:latin typeface="Consolas" panose="020B0609020204030204" pitchFamily="49" charset="0"/>
-              </a:rPr>
-              <a:t>            </a:t>
-            </a:r>
-            <a:r>
-              <a:rPr lang="en-US" sz="2400" dirty="0">
-                <a:solidFill>
-                  <a:srgbClr val="2B91AF"/>
-                </a:solidFill>
-                <a:highlight>
-                  <a:srgbClr val="FFFFFF"/>
-                </a:highlight>
-                <a:latin typeface="Consolas" panose="020B0609020204030204" pitchFamily="49" charset="0"/>
-              </a:rPr>
-              <a:t>List</a:t>
-            </a:r>
-            <a:r>
-              <a:rPr lang="en-US" sz="2400" dirty="0">
-                <a:highlight>
-                  <a:srgbClr val="FFFFFF"/>
-                </a:highlight>
-                <a:latin typeface="Consolas" panose="020B0609020204030204" pitchFamily="49" charset="0"/>
-              </a:rPr>
-              <a:t>&lt;</a:t>
-            </a:r>
-            <a:r>
-              <a:rPr lang="en-US" sz="2400" dirty="0">
-                <a:solidFill>
-                  <a:srgbClr val="0000FF"/>
-                </a:solidFill>
-                <a:highlight>
-                  <a:srgbClr val="FFFFFF"/>
-                </a:highlight>
-                <a:latin typeface="Consolas" panose="020B0609020204030204" pitchFamily="49" charset="0"/>
-              </a:rPr>
-              <a:t>string</a:t>
-            </a:r>
-            <a:r>
-              <a:rPr lang="en-US" sz="2400" dirty="0">
-                <a:highlight>
-                  <a:srgbClr val="FFFFFF"/>
-                </a:highlight>
-                <a:latin typeface="Consolas" panose="020B0609020204030204" pitchFamily="49" charset="0"/>
-              </a:rPr>
-              <a:t>&gt; </a:t>
-            </a:r>
-            <a:r>
-              <a:rPr lang="en-US" sz="2400" dirty="0" err="1">
-                <a:highlight>
-                  <a:srgbClr val="FFFFFF"/>
-                </a:highlight>
-                <a:latin typeface="Consolas" panose="020B0609020204030204" pitchFamily="49" charset="0"/>
-              </a:rPr>
-              <a:t>nomesAlunos</a:t>
-            </a:r>
-            <a:r>
-              <a:rPr lang="en-US" sz="2400" dirty="0">
-                <a:highlight>
-                  <a:srgbClr val="FFFFFF"/>
-                </a:highlight>
-                <a:latin typeface="Consolas" panose="020B0609020204030204" pitchFamily="49" charset="0"/>
-              </a:rPr>
-              <a:t> = </a:t>
-            </a:r>
-            <a:r>
-              <a:rPr lang="en-US" sz="2400" dirty="0">
-                <a:solidFill>
-                  <a:srgbClr val="0000FF"/>
-                </a:solidFill>
-                <a:highlight>
-                  <a:srgbClr val="FFFFFF"/>
-                </a:highlight>
-                <a:latin typeface="Consolas" panose="020B0609020204030204" pitchFamily="49" charset="0"/>
-              </a:rPr>
-              <a:t>new</a:t>
-            </a:r>
-            <a:r>
-              <a:rPr lang="en-US" sz="2400" dirty="0">
-                <a:highlight>
-                  <a:srgbClr val="FFFFFF"/>
-                </a:highlight>
-                <a:latin typeface="Consolas" panose="020B0609020204030204" pitchFamily="49" charset="0"/>
-              </a:rPr>
-              <a:t> </a:t>
-            </a:r>
-            <a:r>
-              <a:rPr lang="en-US" sz="2400" dirty="0">
-                <a:solidFill>
-                  <a:srgbClr val="2B91AF"/>
-                </a:solidFill>
-                <a:highlight>
-                  <a:srgbClr val="FFFFFF"/>
-                </a:highlight>
-                <a:latin typeface="Consolas" panose="020B0609020204030204" pitchFamily="49" charset="0"/>
-              </a:rPr>
-              <a:t>List</a:t>
-            </a:r>
-            <a:r>
-              <a:rPr lang="en-US" sz="2400" dirty="0">
-                <a:highlight>
-                  <a:srgbClr val="FFFFFF"/>
-                </a:highlight>
-                <a:latin typeface="Consolas" panose="020B0609020204030204" pitchFamily="49" charset="0"/>
-              </a:rPr>
-              <a:t>&lt;</a:t>
-            </a:r>
-            <a:r>
-              <a:rPr lang="en-US" sz="2400" dirty="0">
-                <a:solidFill>
-                  <a:srgbClr val="0000FF"/>
-                </a:solidFill>
-                <a:highlight>
-                  <a:srgbClr val="FFFFFF"/>
-                </a:highlight>
-                <a:latin typeface="Consolas" panose="020B0609020204030204" pitchFamily="49" charset="0"/>
-              </a:rPr>
-              <a:t>string</a:t>
-            </a:r>
-            <a:r>
-              <a:rPr lang="en-US" sz="2400" dirty="0">
-                <a:highlight>
-                  <a:srgbClr val="FFFFFF"/>
-                </a:highlight>
-                <a:latin typeface="Consolas" panose="020B0609020204030204" pitchFamily="49" charset="0"/>
-              </a:rPr>
-              <a:t>&gt;();</a:t>
-            </a:r>
-          </a:p>
-          <a:p>
-            <a:r>
-              <a:rPr lang="en-US" sz="2400" dirty="0">
-                <a:highlight>
-                  <a:srgbClr val="FFFFFF"/>
-                </a:highlight>
-                <a:latin typeface="Consolas" panose="020B0609020204030204" pitchFamily="49" charset="0"/>
-              </a:rPr>
-              <a:t>            </a:t>
-            </a:r>
-            <a:r>
-              <a:rPr lang="en-US" sz="2400" dirty="0" err="1">
-                <a:highlight>
-                  <a:srgbClr val="FFFFFF"/>
-                </a:highlight>
-                <a:latin typeface="Consolas" panose="020B0609020204030204" pitchFamily="49" charset="0"/>
-              </a:rPr>
-              <a:t>nomesAlunos.Add</a:t>
-            </a:r>
-            <a:r>
-              <a:rPr lang="en-US" sz="2400" dirty="0">
-                <a:highlight>
-                  <a:srgbClr val="FFFFFF"/>
-                </a:highlight>
-                <a:latin typeface="Consolas" panose="020B0609020204030204" pitchFamily="49" charset="0"/>
-              </a:rPr>
-              <a:t>(</a:t>
-            </a:r>
-            <a:r>
-              <a:rPr lang="en-US" sz="2400" dirty="0">
-                <a:solidFill>
-                  <a:srgbClr val="A31515"/>
-                </a:solidFill>
-                <a:highlight>
-                  <a:srgbClr val="FFFFFF"/>
-                </a:highlight>
-                <a:latin typeface="Consolas" panose="020B0609020204030204" pitchFamily="49" charset="0"/>
-              </a:rPr>
-              <a:t>"</a:t>
-            </a:r>
-            <a:r>
-              <a:rPr lang="en-US" sz="2400" dirty="0" err="1">
-                <a:solidFill>
-                  <a:srgbClr val="A31515"/>
-                </a:solidFill>
-                <a:highlight>
-                  <a:srgbClr val="FFFFFF"/>
-                </a:highlight>
-                <a:latin typeface="Consolas" panose="020B0609020204030204" pitchFamily="49" charset="0"/>
-              </a:rPr>
-              <a:t>Guinho</a:t>
-            </a:r>
-            <a:r>
-              <a:rPr lang="en-US" sz="2400" dirty="0">
-                <a:solidFill>
-                  <a:srgbClr val="A31515"/>
-                </a:solidFill>
-                <a:highlight>
-                  <a:srgbClr val="FFFFFF"/>
-                </a:highlight>
-                <a:latin typeface="Consolas" panose="020B0609020204030204" pitchFamily="49" charset="0"/>
-              </a:rPr>
-              <a:t>"</a:t>
-            </a:r>
-            <a:r>
-              <a:rPr lang="en-US" sz="2400" dirty="0">
-                <a:highlight>
-                  <a:srgbClr val="FFFFFF"/>
-                </a:highlight>
-                <a:latin typeface="Consolas" panose="020B0609020204030204" pitchFamily="49" charset="0"/>
-              </a:rPr>
-              <a:t>);</a:t>
-            </a:r>
-          </a:p>
-          <a:p>
-            <a:r>
-              <a:rPr lang="en-US" sz="2400" dirty="0">
-                <a:highlight>
-                  <a:srgbClr val="FFFFFF"/>
-                </a:highlight>
-                <a:latin typeface="Consolas" panose="020B0609020204030204" pitchFamily="49" charset="0"/>
-              </a:rPr>
-              <a:t>            </a:t>
-            </a:r>
-            <a:r>
-              <a:rPr lang="en-US" sz="2400" dirty="0" err="1">
-                <a:highlight>
-                  <a:srgbClr val="FFFFFF"/>
-                </a:highlight>
-                <a:latin typeface="Consolas" panose="020B0609020204030204" pitchFamily="49" charset="0"/>
-              </a:rPr>
-              <a:t>nomesAlunos.Add</a:t>
-            </a:r>
-            <a:r>
-              <a:rPr lang="en-US" sz="2400" dirty="0">
-                <a:highlight>
-                  <a:srgbClr val="FFFFFF"/>
-                </a:highlight>
-                <a:latin typeface="Consolas" panose="020B0609020204030204" pitchFamily="49" charset="0"/>
-              </a:rPr>
-              <a:t>(</a:t>
-            </a:r>
-            <a:r>
-              <a:rPr lang="en-US" sz="2400" dirty="0">
-                <a:solidFill>
-                  <a:srgbClr val="A31515"/>
-                </a:solidFill>
-                <a:highlight>
-                  <a:srgbClr val="FFFFFF"/>
-                </a:highlight>
-                <a:latin typeface="Consolas" panose="020B0609020204030204" pitchFamily="49" charset="0"/>
-              </a:rPr>
-              <a:t>"</a:t>
-            </a:r>
-            <a:r>
-              <a:rPr lang="en-US" sz="2400" dirty="0" err="1">
-                <a:solidFill>
-                  <a:srgbClr val="A31515"/>
-                </a:solidFill>
-                <a:highlight>
-                  <a:srgbClr val="FFFFFF"/>
-                </a:highlight>
-                <a:latin typeface="Consolas" panose="020B0609020204030204" pitchFamily="49" charset="0"/>
-              </a:rPr>
-              <a:t>Zezinho</a:t>
-            </a:r>
-            <a:r>
-              <a:rPr lang="en-US" sz="2400" dirty="0">
-                <a:solidFill>
-                  <a:srgbClr val="A31515"/>
-                </a:solidFill>
-                <a:highlight>
-                  <a:srgbClr val="FFFFFF"/>
-                </a:highlight>
-                <a:latin typeface="Consolas" panose="020B0609020204030204" pitchFamily="49" charset="0"/>
-              </a:rPr>
-              <a:t>"</a:t>
-            </a:r>
-            <a:r>
-              <a:rPr lang="en-US" sz="2400" dirty="0">
-                <a:highlight>
-                  <a:srgbClr val="FFFFFF"/>
-                </a:highlight>
-                <a:latin typeface="Consolas" panose="020B0609020204030204" pitchFamily="49" charset="0"/>
-              </a:rPr>
-              <a:t>);</a:t>
-            </a:r>
-          </a:p>
-          <a:p>
-            <a:r>
-              <a:rPr lang="en-US" sz="2400" dirty="0">
-                <a:highlight>
-                  <a:srgbClr val="FFFFFF"/>
-                </a:highlight>
-                <a:latin typeface="Consolas" panose="020B0609020204030204" pitchFamily="49" charset="0"/>
-              </a:rPr>
-              <a:t>            </a:t>
-            </a:r>
-            <a:r>
-              <a:rPr lang="en-US" sz="2400" dirty="0" err="1">
-                <a:highlight>
-                  <a:srgbClr val="FFFFFF"/>
-                </a:highlight>
-                <a:latin typeface="Consolas" panose="020B0609020204030204" pitchFamily="49" charset="0"/>
-              </a:rPr>
-              <a:t>nomesAlunos.Add</a:t>
-            </a:r>
-            <a:r>
-              <a:rPr lang="en-US" sz="2400" dirty="0">
-                <a:highlight>
-                  <a:srgbClr val="FFFFFF"/>
-                </a:highlight>
-                <a:latin typeface="Consolas" panose="020B0609020204030204" pitchFamily="49" charset="0"/>
-              </a:rPr>
-              <a:t>(</a:t>
-            </a:r>
-            <a:r>
-              <a:rPr lang="en-US" sz="2400" dirty="0">
-                <a:solidFill>
-                  <a:srgbClr val="A31515"/>
-                </a:solidFill>
-                <a:highlight>
-                  <a:srgbClr val="FFFFFF"/>
-                </a:highlight>
-                <a:latin typeface="Consolas" panose="020B0609020204030204" pitchFamily="49" charset="0"/>
-              </a:rPr>
-              <a:t>"</a:t>
-            </a:r>
-            <a:r>
-              <a:rPr lang="en-US" sz="2400" dirty="0" err="1">
-                <a:solidFill>
-                  <a:srgbClr val="A31515"/>
-                </a:solidFill>
-                <a:highlight>
-                  <a:srgbClr val="FFFFFF"/>
-                </a:highlight>
-                <a:latin typeface="Consolas" panose="020B0609020204030204" pitchFamily="49" charset="0"/>
-              </a:rPr>
-              <a:t>Luizinho</a:t>
-            </a:r>
-            <a:r>
-              <a:rPr lang="en-US" sz="2400" dirty="0">
-                <a:solidFill>
-                  <a:srgbClr val="A31515"/>
-                </a:solidFill>
-                <a:highlight>
-                  <a:srgbClr val="FFFFFF"/>
-                </a:highlight>
-                <a:latin typeface="Consolas" panose="020B0609020204030204" pitchFamily="49" charset="0"/>
-              </a:rPr>
-              <a:t>"</a:t>
-            </a:r>
-            <a:r>
-              <a:rPr lang="en-US" sz="2400" dirty="0">
-                <a:highlight>
-                  <a:srgbClr val="FFFFFF"/>
-                </a:highlight>
-                <a:latin typeface="Consolas" panose="020B0609020204030204" pitchFamily="49" charset="0"/>
-              </a:rPr>
-              <a:t>);</a:t>
-            </a:r>
-          </a:p>
-          <a:p>
-            <a:endParaRPr lang="en-US" sz="2400" dirty="0">
-              <a:highlight>
-                <a:srgbClr val="FFFFFF"/>
-              </a:highlight>
-              <a:latin typeface="Consolas" panose="020B0609020204030204" pitchFamily="49" charset="0"/>
-            </a:endParaRPr>
-          </a:p>
-          <a:p>
-            <a:r>
-              <a:rPr lang="en-US" sz="2400" dirty="0">
-                <a:highlight>
-                  <a:srgbClr val="FFFFFF"/>
-                </a:highlight>
-                <a:latin typeface="Consolas" panose="020B0609020204030204" pitchFamily="49" charset="0"/>
-              </a:rPr>
-              <a:t>            </a:t>
-            </a:r>
-            <a:r>
-              <a:rPr lang="en-US" sz="2400" dirty="0" err="1">
-                <a:solidFill>
-                  <a:srgbClr val="0000FF"/>
-                </a:solidFill>
-                <a:highlight>
-                  <a:srgbClr val="FFFFFF"/>
-                </a:highlight>
-                <a:latin typeface="Consolas" panose="020B0609020204030204" pitchFamily="49" charset="0"/>
-              </a:rPr>
-              <a:t>foreach</a:t>
-            </a:r>
-            <a:r>
-              <a:rPr lang="en-US" sz="2400" dirty="0">
-                <a:highlight>
-                  <a:srgbClr val="FFFFFF"/>
-                </a:highlight>
-                <a:latin typeface="Consolas" panose="020B0609020204030204" pitchFamily="49" charset="0"/>
-              </a:rPr>
-              <a:t> (</a:t>
-            </a:r>
-            <a:r>
-              <a:rPr lang="en-US" sz="2400" dirty="0">
-                <a:solidFill>
-                  <a:srgbClr val="0000FF"/>
-                </a:solidFill>
-                <a:highlight>
-                  <a:srgbClr val="FFFFFF"/>
-                </a:highlight>
-                <a:latin typeface="Consolas" panose="020B0609020204030204" pitchFamily="49" charset="0"/>
-              </a:rPr>
-              <a:t>string</a:t>
-            </a:r>
-            <a:r>
-              <a:rPr lang="en-US" sz="2400" dirty="0">
-                <a:highlight>
-                  <a:srgbClr val="FFFFFF"/>
-                </a:highlight>
-                <a:latin typeface="Consolas" panose="020B0609020204030204" pitchFamily="49" charset="0"/>
-              </a:rPr>
-              <a:t> </a:t>
-            </a:r>
-            <a:r>
-              <a:rPr lang="en-US" sz="2400" dirty="0" err="1">
-                <a:highlight>
-                  <a:srgbClr val="FFFFFF"/>
-                </a:highlight>
-                <a:latin typeface="Consolas" panose="020B0609020204030204" pitchFamily="49" charset="0"/>
-              </a:rPr>
-              <a:t>nome</a:t>
-            </a:r>
-            <a:r>
-              <a:rPr lang="en-US" sz="2400" dirty="0">
-                <a:highlight>
-                  <a:srgbClr val="FFFFFF"/>
-                </a:highlight>
-                <a:latin typeface="Consolas" panose="020B0609020204030204" pitchFamily="49" charset="0"/>
-              </a:rPr>
-              <a:t> </a:t>
-            </a:r>
-            <a:r>
-              <a:rPr lang="en-US" sz="2400" dirty="0">
-                <a:solidFill>
-                  <a:srgbClr val="0000FF"/>
-                </a:solidFill>
-                <a:highlight>
-                  <a:srgbClr val="FFFFFF"/>
-                </a:highlight>
-                <a:latin typeface="Consolas" panose="020B0609020204030204" pitchFamily="49" charset="0"/>
-              </a:rPr>
-              <a:t>in</a:t>
-            </a:r>
-            <a:r>
-              <a:rPr lang="en-US" sz="2400" dirty="0">
-                <a:highlight>
-                  <a:srgbClr val="FFFFFF"/>
-                </a:highlight>
-                <a:latin typeface="Consolas" panose="020B0609020204030204" pitchFamily="49" charset="0"/>
-              </a:rPr>
-              <a:t> </a:t>
-            </a:r>
-            <a:r>
-              <a:rPr lang="en-US" sz="2400" dirty="0" err="1">
-                <a:highlight>
-                  <a:srgbClr val="FFFFFF"/>
-                </a:highlight>
-                <a:latin typeface="Consolas" panose="020B0609020204030204" pitchFamily="49" charset="0"/>
-              </a:rPr>
-              <a:t>nomesAlunos</a:t>
-            </a:r>
-            <a:r>
-              <a:rPr lang="en-US" sz="2400" dirty="0">
-                <a:highlight>
-                  <a:srgbClr val="FFFFFF"/>
-                </a:highlight>
-                <a:latin typeface="Consolas" panose="020B0609020204030204" pitchFamily="49" charset="0"/>
-              </a:rPr>
-              <a:t>)</a:t>
-            </a:r>
-          </a:p>
-          <a:p>
-            <a:r>
-              <a:rPr lang="en-US" sz="2400" dirty="0">
-                <a:highlight>
-                  <a:srgbClr val="FFFFFF"/>
-                </a:highlight>
-                <a:latin typeface="Consolas" panose="020B0609020204030204" pitchFamily="49" charset="0"/>
-              </a:rPr>
-              <a:t>            {</a:t>
-            </a:r>
-          </a:p>
-          <a:p>
-            <a:r>
-              <a:rPr lang="en-US" sz="2400" dirty="0">
-                <a:highlight>
-                  <a:srgbClr val="FFFFFF"/>
-                </a:highlight>
-                <a:latin typeface="Consolas" panose="020B0609020204030204" pitchFamily="49" charset="0"/>
-              </a:rPr>
-              <a:t>                </a:t>
-            </a:r>
-            <a:r>
-              <a:rPr lang="en-US" sz="2400" dirty="0" err="1">
-                <a:solidFill>
-                  <a:srgbClr val="2B91AF"/>
-                </a:solidFill>
-                <a:highlight>
-                  <a:srgbClr val="FFFFFF"/>
-                </a:highlight>
-                <a:latin typeface="Consolas" panose="020B0609020204030204" pitchFamily="49" charset="0"/>
-              </a:rPr>
-              <a:t>Console</a:t>
-            </a:r>
-            <a:r>
-              <a:rPr lang="en-US" sz="2400" dirty="0" err="1">
-                <a:highlight>
-                  <a:srgbClr val="FFFFFF"/>
-                </a:highlight>
-                <a:latin typeface="Consolas" panose="020B0609020204030204" pitchFamily="49" charset="0"/>
-              </a:rPr>
-              <a:t>.WriteLine</a:t>
-            </a:r>
-            <a:r>
-              <a:rPr lang="en-US" sz="2400" dirty="0">
-                <a:highlight>
-                  <a:srgbClr val="FFFFFF"/>
-                </a:highlight>
-                <a:latin typeface="Consolas" panose="020B0609020204030204" pitchFamily="49" charset="0"/>
-              </a:rPr>
-              <a:t>(</a:t>
-            </a:r>
-            <a:r>
-              <a:rPr lang="en-US" sz="2400" dirty="0" err="1">
-                <a:highlight>
-                  <a:srgbClr val="FFFFFF"/>
-                </a:highlight>
-                <a:latin typeface="Consolas" panose="020B0609020204030204" pitchFamily="49" charset="0"/>
-              </a:rPr>
-              <a:t>nome</a:t>
-            </a:r>
-            <a:r>
-              <a:rPr lang="en-US" sz="2400" dirty="0">
-                <a:highlight>
-                  <a:srgbClr val="FFFFFF"/>
-                </a:highlight>
-                <a:latin typeface="Consolas" panose="020B0609020204030204" pitchFamily="49" charset="0"/>
-              </a:rPr>
-              <a:t>);</a:t>
-            </a:r>
-          </a:p>
-          <a:p>
-            <a:r>
-              <a:rPr lang="en-US" sz="2400" dirty="0">
-                <a:highlight>
-                  <a:srgbClr val="FFFFFF"/>
-                </a:highlight>
-                <a:latin typeface="Consolas" panose="020B0609020204030204" pitchFamily="49" charset="0"/>
-              </a:rPr>
-              <a:t>            }</a:t>
-            </a:r>
-            <a:endParaRPr lang="pt-BR" altLang="pt-BR" sz="2400" kern="0" dirty="0" smtClean="0">
-              <a:latin typeface="Segoe UI Light" panose="020B0502040204020203" pitchFamily="34" charset="0"/>
-              <a:cs typeface="Segoe UI Light" panose="020B0502040204020203" pitchFamily="34" charset="0"/>
-            </a:endParaRPr>
-          </a:p>
-        </p:txBody>
-      </p:sp>
-    </p:spTree>
-    <p:custDataLst>
-      <p:tags r:id="rId1"/>
-    </p:custDataLst>
-    <p:extLst>
-      <p:ext uri="{BB962C8B-B14F-4D97-AF65-F5344CB8AC3E}">
-        <p14:creationId xmlns:p14="http://schemas.microsoft.com/office/powerpoint/2010/main" val="2285803617"/>
-      </p:ext>
-    </p:extLst>
-  </p:cSld>
-  <p:clrMapOvr>
-    <a:masterClrMapping/>
-  </p:clrMapOvr>
-  <p:transition>
-    <p:fade/>
-  </p:transition>
-  <p:timing>
-    <p:tnLst>
-      <p:par>
-        <p:cTn id="1" dur="indefinite" restart="never" nodeType="tmRoot"/>
-      </p:par>
-    </p:tnLst>
-  </p:timing>
-</p:sld>
-</file>
-
-<file path=ppt/slides/slide11.xml><?xml version="1.0" encoding="utf-8"?>
 <p:sld xmlns:a="http://schemas.openxmlformats.org/drawingml/2006/main" xmlns:r="http://schemas.openxmlformats.org/officeDocument/2006/relationships" xmlns:p="http://schemas.openxmlformats.org/presentationml/2006/main">
   <p:cSld>
     <p:spTree>
@@ -6642,7 +5735,7 @@
                 <a:cs typeface="Segoe UI Light" panose="020B0502040204020203" pitchFamily="34" charset="0"/>
                 <a:sym typeface="Quattrocento Sans"/>
               </a:rPr>
-              <a:t>Utilizadades</a:t>
+              <a:t>Utilidades</a:t>
             </a:r>
             <a:endParaRPr lang="en-US" sz="5400" b="0" i="1" strike="noStrike" cap="none" baseline="0" dirty="0">
               <a:solidFill>
@@ -6679,7 +5772,7 @@
 </p:sld>
 </file>
 
-<file path=ppt/slides/slide12.xml><?xml version="1.0" encoding="utf-8"?>
+<file path=ppt/slides/slide11.xml><?xml version="1.0" encoding="utf-8"?>
 <p:sld xmlns:a="http://schemas.openxmlformats.org/drawingml/2006/main" xmlns:r="http://schemas.openxmlformats.org/officeDocument/2006/relationships" xmlns:p="http://schemas.openxmlformats.org/presentationml/2006/main">
   <p:cSld>
     <p:spTree>
@@ -7712,7 +6805,7 @@
 </p:sld>
 </file>
 
-<file path=ppt/slides/slide13.xml><?xml version="1.0" encoding="utf-8"?>
+<file path=ppt/slides/slide12.xml><?xml version="1.0" encoding="utf-8"?>
 <p:sld xmlns:a="http://schemas.openxmlformats.org/drawingml/2006/main" xmlns:r="http://schemas.openxmlformats.org/officeDocument/2006/relationships" xmlns:p="http://schemas.openxmlformats.org/presentationml/2006/main">
   <p:cSld>
     <p:spTree>
@@ -7813,6 +6906,887 @@
     <p:extLst>
       <p:ext uri="{BB962C8B-B14F-4D97-AF65-F5344CB8AC3E}">
         <p14:creationId xmlns:p14="http://schemas.microsoft.com/office/powerpoint/2010/main" val="3204257720"/>
+      </p:ext>
+    </p:extLst>
+  </p:cSld>
+  <p:clrMapOvr>
+    <a:masterClrMapping/>
+  </p:clrMapOvr>
+  <p:transition>
+    <p:fade/>
+  </p:transition>
+  <p:timing>
+    <p:tnLst>
+      <p:par>
+        <p:cTn id="1" dur="indefinite" restart="never" nodeType="tmRoot"/>
+      </p:par>
+    </p:tnLst>
+  </p:timing>
+</p:sld>
+</file>
+
+<file path=ppt/slides/slide13.xml><?xml version="1.0" encoding="utf-8"?>
+<p:sld xmlns:a="http://schemas.openxmlformats.org/drawingml/2006/main" xmlns:r="http://schemas.openxmlformats.org/officeDocument/2006/relationships" xmlns:p="http://schemas.openxmlformats.org/presentationml/2006/main">
+  <p:cSld>
+    <p:spTree>
+      <p:nvGrpSpPr>
+        <p:cNvPr id="1" name="Shape 336"/>
+        <p:cNvGrpSpPr/>
+        <p:nvPr/>
+      </p:nvGrpSpPr>
+      <p:grpSpPr>
+        <a:xfrm>
+          <a:off x="0" y="0"/>
+          <a:ext cx="0" cy="0"/>
+          <a:chOff x="0" y="0"/>
+          <a:chExt cx="0" cy="0"/>
+        </a:xfrm>
+      </p:grpSpPr>
+      <p:sp>
+        <p:nvSpPr>
+          <p:cNvPr id="4" name="Shape 494"/>
+          <p:cNvSpPr txBox="1">
+            <a:spLocks/>
+          </p:cNvSpPr>
+          <p:nvPr/>
+        </p:nvSpPr>
+        <p:spPr>
+          <a:xfrm>
+            <a:off x="0" y="0"/>
+            <a:ext cx="12191999" cy="979136"/>
+          </a:xfrm>
+          <a:prstGeom prst="rect">
+            <a:avLst/>
+          </a:prstGeom>
+          <a:solidFill>
+            <a:schemeClr val="accent6">
+              <a:lumMod val="75000"/>
+            </a:schemeClr>
+          </a:solidFill>
+          <a:ln>
+            <a:noFill/>
+          </a:ln>
+        </p:spPr>
+        <p:txBody>
+          <a:bodyPr lIns="0" tIns="0" rIns="0" bIns="0" anchor="ctr" anchorCtr="0">
+            <a:noAutofit/>
+          </a:bodyPr>
+          <a:lstStyle>
+            <a:defPPr marR="0" algn="l" rtl="0">
+              <a:lnSpc>
+                <a:spcPct val="100000"/>
+              </a:lnSpc>
+              <a:spcBef>
+                <a:spcPts val="0"/>
+              </a:spcBef>
+              <a:spcAft>
+                <a:spcPts val="0"/>
+              </a:spcAft>
+            </a:defPPr>
+            <a:lvl1pPr marL="0" marR="0" indent="0" algn="l" rtl="0">
+              <a:lnSpc>
+                <a:spcPct val="90000"/>
+              </a:lnSpc>
+              <a:spcBef>
+                <a:spcPts val="0"/>
+              </a:spcBef>
+              <a:spcAft>
+                <a:spcPts val="0"/>
+              </a:spcAft>
+              <a:buClr>
+                <a:schemeClr val="dk1"/>
+              </a:buClr>
+              <a:buFont typeface="Quattrocento Sans"/>
+              <a:buNone/>
+              <a:defRPr sz="1400" b="0" i="0" u="none" strike="noStrike" cap="none" baseline="0">
+                <a:solidFill>
+                  <a:srgbClr val="000000"/>
+                </a:solidFill>
+                <a:latin typeface="Arial"/>
+                <a:ea typeface="Arial"/>
+                <a:cs typeface="Arial"/>
+                <a:sym typeface="Arial"/>
+                <a:rtl val="0"/>
+              </a:defRPr>
+            </a:lvl1pPr>
+            <a:lvl2pPr marL="0" marR="0" indent="0" algn="l" rtl="0">
+              <a:lnSpc>
+                <a:spcPct val="100000"/>
+              </a:lnSpc>
+              <a:spcBef>
+                <a:spcPts val="0"/>
+              </a:spcBef>
+              <a:spcAft>
+                <a:spcPts val="0"/>
+              </a:spcAft>
+              <a:buNone/>
+              <a:defRPr sz="1400" b="0" i="0" u="none" strike="noStrike" cap="none" baseline="0">
+                <a:solidFill>
+                  <a:srgbClr val="000000"/>
+                </a:solidFill>
+                <a:latin typeface="Arial"/>
+                <a:ea typeface="Arial"/>
+                <a:cs typeface="Arial"/>
+                <a:sym typeface="Arial"/>
+                <a:rtl val="0"/>
+              </a:defRPr>
+            </a:lvl2pPr>
+            <a:lvl3pPr marL="0" marR="0" indent="0" algn="l" rtl="0">
+              <a:spcBef>
+                <a:spcPts val="0"/>
+              </a:spcBef>
+              <a:defRPr/>
+            </a:lvl3pPr>
+            <a:lvl4pPr marL="0" marR="0" indent="0" algn="l" rtl="0">
+              <a:spcBef>
+                <a:spcPts val="0"/>
+              </a:spcBef>
+              <a:defRPr/>
+            </a:lvl4pPr>
+            <a:lvl5pPr marL="0" marR="0" indent="0" algn="l" rtl="0">
+              <a:spcBef>
+                <a:spcPts val="0"/>
+              </a:spcBef>
+              <a:defRPr/>
+            </a:lvl5pPr>
+            <a:lvl6pPr marL="0" marR="0" indent="0" algn="l" rtl="0">
+              <a:spcBef>
+                <a:spcPts val="0"/>
+              </a:spcBef>
+              <a:defRPr/>
+            </a:lvl6pPr>
+            <a:lvl7pPr marL="0" marR="0" indent="0" algn="l" rtl="0">
+              <a:spcBef>
+                <a:spcPts val="0"/>
+              </a:spcBef>
+              <a:defRPr/>
+            </a:lvl7pPr>
+            <a:lvl8pPr marL="0" marR="0" indent="0" algn="l" rtl="0">
+              <a:spcBef>
+                <a:spcPts val="0"/>
+              </a:spcBef>
+              <a:defRPr/>
+            </a:lvl8pPr>
+            <a:lvl9pPr marL="0" marR="0" indent="0" algn="l" rtl="0">
+              <a:spcBef>
+                <a:spcPts val="0"/>
+              </a:spcBef>
+              <a:defRPr/>
+            </a:lvl9pPr>
+          </a:lstStyle>
+          <a:p>
+            <a:pPr marL="360000">
+              <a:buClr>
+                <a:schemeClr val="dk2"/>
+              </a:buClr>
+              <a:buSzPct val="25000"/>
+            </a:pPr>
+            <a:r>
+              <a:rPr lang="en-US" sz="3600" dirty="0" err="1" smtClean="0">
+                <a:solidFill>
+                  <a:schemeClr val="bg1"/>
+                </a:solidFill>
+                <a:latin typeface="Segoe UI Light" panose="020B0502040204020203" pitchFamily="34" charset="0"/>
+                <a:ea typeface="Quattrocento Sans"/>
+                <a:cs typeface="Segoe UI Light" panose="020B0502040204020203" pitchFamily="34" charset="0"/>
+                <a:sym typeface="Quattrocento Sans"/>
+              </a:rPr>
+              <a:t>Tratamento</a:t>
+            </a:r>
+            <a:r>
+              <a:rPr lang="en-US" sz="3600" dirty="0" smtClean="0">
+                <a:solidFill>
+                  <a:schemeClr val="bg1"/>
+                </a:solidFill>
+                <a:latin typeface="Segoe UI Light" panose="020B0502040204020203" pitchFamily="34" charset="0"/>
+                <a:ea typeface="Quattrocento Sans"/>
+                <a:cs typeface="Segoe UI Light" panose="020B0502040204020203" pitchFamily="34" charset="0"/>
+                <a:sym typeface="Quattrocento Sans"/>
+              </a:rPr>
+              <a:t> de </a:t>
+            </a:r>
+            <a:r>
+              <a:rPr lang="en-US" sz="3600" dirty="0" err="1" smtClean="0">
+                <a:solidFill>
+                  <a:schemeClr val="bg1"/>
+                </a:solidFill>
+                <a:latin typeface="Segoe UI Light" panose="020B0502040204020203" pitchFamily="34" charset="0"/>
+                <a:ea typeface="Quattrocento Sans"/>
+                <a:cs typeface="Segoe UI Light" panose="020B0502040204020203" pitchFamily="34" charset="0"/>
+                <a:sym typeface="Quattrocento Sans"/>
+              </a:rPr>
+              <a:t>erros</a:t>
+            </a:r>
+            <a:endParaRPr lang="en-US" sz="3600" dirty="0">
+              <a:solidFill>
+                <a:schemeClr val="bg1"/>
+              </a:solidFill>
+              <a:latin typeface="Segoe UI Light" panose="020B0502040204020203" pitchFamily="34" charset="0"/>
+              <a:ea typeface="Quattrocento Sans"/>
+              <a:cs typeface="Segoe UI Light" panose="020B0502040204020203" pitchFamily="34" charset="0"/>
+              <a:sym typeface="Quattrocento Sans"/>
+            </a:endParaRPr>
+          </a:p>
+        </p:txBody>
+      </p:sp>
+      <p:sp>
+        <p:nvSpPr>
+          <p:cNvPr id="10" name="Content Placeholder 2"/>
+          <p:cNvSpPr txBox="1">
+            <a:spLocks/>
+          </p:cNvSpPr>
+          <p:nvPr/>
+        </p:nvSpPr>
+        <p:spPr>
+          <a:xfrm>
+            <a:off x="-1" y="1352282"/>
+            <a:ext cx="12191999" cy="4824681"/>
+          </a:xfrm>
+          <a:prstGeom prst="rect">
+            <a:avLst/>
+          </a:prstGeom>
+        </p:spPr>
+        <p:txBody>
+          <a:bodyPr/>
+          <a:lstStyle>
+            <a:lvl1pPr marL="228600" indent="-228600" algn="l" defTabSz="914400" rtl="0" eaLnBrk="1" latinLnBrk="0" hangingPunct="1">
+              <a:lnSpc>
+                <a:spcPct val="90000"/>
+              </a:lnSpc>
+              <a:spcBef>
+                <a:spcPts val="1000"/>
+              </a:spcBef>
+              <a:buFont typeface="Arial" panose="020B0604020202020204" pitchFamily="34" charset="0"/>
+              <a:buChar char="•"/>
+              <a:defRPr sz="2800" kern="1200">
+                <a:solidFill>
+                  <a:schemeClr val="tx1"/>
+                </a:solidFill>
+                <a:latin typeface="+mn-lt"/>
+                <a:ea typeface="+mn-ea"/>
+                <a:cs typeface="+mn-cs"/>
+              </a:defRPr>
+            </a:lvl1pPr>
+            <a:lvl2pPr marL="685800" indent="-228600" algn="l" defTabSz="914400" rtl="0" eaLnBrk="1" latinLnBrk="0" hangingPunct="1">
+              <a:lnSpc>
+                <a:spcPct val="90000"/>
+              </a:lnSpc>
+              <a:spcBef>
+                <a:spcPts val="500"/>
+              </a:spcBef>
+              <a:buFont typeface="Arial" panose="020B0604020202020204" pitchFamily="34" charset="0"/>
+              <a:buChar char="•"/>
+              <a:defRPr sz="2400" kern="1200">
+                <a:solidFill>
+                  <a:schemeClr val="tx1"/>
+                </a:solidFill>
+                <a:latin typeface="+mn-lt"/>
+                <a:ea typeface="+mn-ea"/>
+                <a:cs typeface="+mn-cs"/>
+              </a:defRPr>
+            </a:lvl2pPr>
+            <a:lvl3pPr marL="1143000" indent="-228600" algn="l" defTabSz="914400" rtl="0" eaLnBrk="1" latinLnBrk="0" hangingPunct="1">
+              <a:lnSpc>
+                <a:spcPct val="90000"/>
+              </a:lnSpc>
+              <a:spcBef>
+                <a:spcPts val="500"/>
+              </a:spcBef>
+              <a:buFont typeface="Arial" panose="020B0604020202020204" pitchFamily="34" charset="0"/>
+              <a:buChar char="•"/>
+              <a:defRPr sz="2000" kern="1200">
+                <a:solidFill>
+                  <a:schemeClr val="tx1"/>
+                </a:solidFill>
+                <a:latin typeface="+mn-lt"/>
+                <a:ea typeface="+mn-ea"/>
+                <a:cs typeface="+mn-cs"/>
+              </a:defRPr>
+            </a:lvl3pPr>
+            <a:lvl4pPr marL="1600200" indent="-228600" algn="l" defTabSz="914400" rtl="0" eaLnBrk="1" latinLnBrk="0" hangingPunct="1">
+              <a:lnSpc>
+                <a:spcPct val="90000"/>
+              </a:lnSpc>
+              <a:spcBef>
+                <a:spcPts val="500"/>
+              </a:spcBef>
+              <a:buFont typeface="Arial" panose="020B0604020202020204" pitchFamily="34" charset="0"/>
+              <a:buChar char="•"/>
+              <a:defRPr sz="1800" kern="1200">
+                <a:solidFill>
+                  <a:schemeClr val="tx1"/>
+                </a:solidFill>
+                <a:latin typeface="+mn-lt"/>
+                <a:ea typeface="+mn-ea"/>
+                <a:cs typeface="+mn-cs"/>
+              </a:defRPr>
+            </a:lvl4pPr>
+            <a:lvl5pPr marL="2057400" indent="-228600" algn="l" defTabSz="914400" rtl="0" eaLnBrk="1" latinLnBrk="0" hangingPunct="1">
+              <a:lnSpc>
+                <a:spcPct val="90000"/>
+              </a:lnSpc>
+              <a:spcBef>
+                <a:spcPts val="500"/>
+              </a:spcBef>
+              <a:buFont typeface="Arial" panose="020B0604020202020204" pitchFamily="34" charset="0"/>
+              <a:buChar char="•"/>
+              <a:defRPr sz="1800" kern="1200">
+                <a:solidFill>
+                  <a:schemeClr val="tx1"/>
+                </a:solidFill>
+                <a:latin typeface="+mn-lt"/>
+                <a:ea typeface="+mn-ea"/>
+                <a:cs typeface="+mn-cs"/>
+              </a:defRPr>
+            </a:lvl5pPr>
+            <a:lvl6pPr marL="2514600" indent="-228600" algn="l" defTabSz="914400" rtl="0" eaLnBrk="1" latinLnBrk="0" hangingPunct="1">
+              <a:lnSpc>
+                <a:spcPct val="90000"/>
+              </a:lnSpc>
+              <a:spcBef>
+                <a:spcPts val="500"/>
+              </a:spcBef>
+              <a:buFont typeface="Arial" panose="020B0604020202020204" pitchFamily="34" charset="0"/>
+              <a:buChar char="•"/>
+              <a:defRPr sz="1800" kern="1200">
+                <a:solidFill>
+                  <a:schemeClr val="tx1"/>
+                </a:solidFill>
+                <a:latin typeface="+mn-lt"/>
+                <a:ea typeface="+mn-ea"/>
+                <a:cs typeface="+mn-cs"/>
+              </a:defRPr>
+            </a:lvl6pPr>
+            <a:lvl7pPr marL="2971800" indent="-228600" algn="l" defTabSz="914400" rtl="0" eaLnBrk="1" latinLnBrk="0" hangingPunct="1">
+              <a:lnSpc>
+                <a:spcPct val="90000"/>
+              </a:lnSpc>
+              <a:spcBef>
+                <a:spcPts val="500"/>
+              </a:spcBef>
+              <a:buFont typeface="Arial" panose="020B0604020202020204" pitchFamily="34" charset="0"/>
+              <a:buChar char="•"/>
+              <a:defRPr sz="1800" kern="1200">
+                <a:solidFill>
+                  <a:schemeClr val="tx1"/>
+                </a:solidFill>
+                <a:latin typeface="+mn-lt"/>
+                <a:ea typeface="+mn-ea"/>
+                <a:cs typeface="+mn-cs"/>
+              </a:defRPr>
+            </a:lvl7pPr>
+            <a:lvl8pPr marL="3429000" indent="-228600" algn="l" defTabSz="914400" rtl="0" eaLnBrk="1" latinLnBrk="0" hangingPunct="1">
+              <a:lnSpc>
+                <a:spcPct val="90000"/>
+              </a:lnSpc>
+              <a:spcBef>
+                <a:spcPts val="500"/>
+              </a:spcBef>
+              <a:buFont typeface="Arial" panose="020B0604020202020204" pitchFamily="34" charset="0"/>
+              <a:buChar char="•"/>
+              <a:defRPr sz="1800" kern="1200">
+                <a:solidFill>
+                  <a:schemeClr val="tx1"/>
+                </a:solidFill>
+                <a:latin typeface="+mn-lt"/>
+                <a:ea typeface="+mn-ea"/>
+                <a:cs typeface="+mn-cs"/>
+              </a:defRPr>
+            </a:lvl8pPr>
+            <a:lvl9pPr marL="3886200" indent="-228600" algn="l" defTabSz="914400" rtl="0" eaLnBrk="1" latinLnBrk="0" hangingPunct="1">
+              <a:lnSpc>
+                <a:spcPct val="90000"/>
+              </a:lnSpc>
+              <a:spcBef>
+                <a:spcPts val="500"/>
+              </a:spcBef>
+              <a:buFont typeface="Arial" panose="020B0604020202020204" pitchFamily="34" charset="0"/>
+              <a:buChar char="•"/>
+              <a:defRPr sz="1800" kern="1200">
+                <a:solidFill>
+                  <a:schemeClr val="tx1"/>
+                </a:solidFill>
+                <a:latin typeface="+mn-lt"/>
+                <a:ea typeface="+mn-ea"/>
+                <a:cs typeface="+mn-cs"/>
+              </a:defRPr>
+            </a:lvl9pPr>
+          </a:lstStyle>
+          <a:p>
+            <a:pPr marL="722376" indent="-347472"/>
+            <a:r>
+              <a:rPr lang="pt-BR" dirty="0" smtClean="0">
+                <a:latin typeface="Segoe UI Light" panose="020B0502040204020203" pitchFamily="34" charset="0"/>
+                <a:cs typeface="Segoe UI Light" panose="020B0502040204020203" pitchFamily="34" charset="0"/>
+              </a:rPr>
+              <a:t>É sempre bom produzir código que esteja imune a </a:t>
+            </a:r>
+            <a:r>
+              <a:rPr lang="pt-BR" dirty="0" smtClean="0">
+                <a:latin typeface="Segoe UI Light" panose="020B0502040204020203" pitchFamily="34" charset="0"/>
+                <a:cs typeface="Segoe UI Light" panose="020B0502040204020203" pitchFamily="34" charset="0"/>
+              </a:rPr>
+              <a:t>erros/exceções. </a:t>
+            </a:r>
+            <a:r>
+              <a:rPr lang="pt-BR" dirty="0" smtClean="0">
+                <a:latin typeface="Segoe UI Light" panose="020B0502040204020203" pitchFamily="34" charset="0"/>
+                <a:cs typeface="Segoe UI Light" panose="020B0502040204020203" pitchFamily="34" charset="0"/>
+              </a:rPr>
+              <a:t>Para isso</a:t>
+            </a:r>
+            <a:r>
+              <a:rPr lang="pt-BR" dirty="0" smtClean="0">
+                <a:latin typeface="Segoe UI Light" panose="020B0502040204020203" pitchFamily="34" charset="0"/>
+                <a:cs typeface="Segoe UI Light" panose="020B0502040204020203" pitchFamily="34" charset="0"/>
+              </a:rPr>
+              <a:t>, podemos utilizar um bloco </a:t>
+            </a:r>
+            <a:r>
+              <a:rPr lang="pt-BR" dirty="0" smtClean="0">
+                <a:latin typeface="Consolas" panose="020B0609020204030204" pitchFamily="49" charset="0"/>
+                <a:cs typeface="Segoe UI Light" panose="020B0502040204020203" pitchFamily="34" charset="0"/>
+              </a:rPr>
+              <a:t>try..catch..finally</a:t>
+            </a:r>
+            <a:r>
+              <a:rPr lang="pt-BR" dirty="0" smtClean="0">
+                <a:latin typeface="Segoe UI Light" panose="020B0502040204020203" pitchFamily="34" charset="0"/>
+                <a:cs typeface="Segoe UI Light" panose="020B0502040204020203" pitchFamily="34" charset="0"/>
+              </a:rPr>
+              <a:t>:</a:t>
+            </a:r>
+            <a:endParaRPr lang="pt-BR" sz="1600" dirty="0" smtClean="0">
+              <a:latin typeface="Segoe UI Light" panose="020B0502040204020203" pitchFamily="34" charset="0"/>
+              <a:cs typeface="Segoe UI Light" panose="020B0502040204020203" pitchFamily="34" charset="0"/>
+            </a:endParaRPr>
+          </a:p>
+          <a:p>
+            <a:pPr marL="0" indent="0">
+              <a:buNone/>
+            </a:pPr>
+            <a:r>
+              <a:rPr lang="en-US" sz="1400" dirty="0">
+                <a:solidFill>
+                  <a:srgbClr val="000000"/>
+                </a:solidFill>
+                <a:highlight>
+                  <a:srgbClr val="FFFFFF"/>
+                </a:highlight>
+                <a:latin typeface="Consolas" panose="020B0609020204030204" pitchFamily="49" charset="0"/>
+              </a:rPr>
+              <a:t>            </a:t>
+            </a:r>
+            <a:r>
+              <a:rPr lang="en-US" sz="1400" dirty="0" smtClean="0">
+                <a:solidFill>
+                  <a:srgbClr val="0000FF"/>
+                </a:solidFill>
+                <a:highlight>
+                  <a:srgbClr val="FFFFFF"/>
+                </a:highlight>
+                <a:latin typeface="Consolas" panose="020B0609020204030204" pitchFamily="49" charset="0"/>
+              </a:rPr>
+              <a:t>try</a:t>
+            </a:r>
+            <a:endParaRPr lang="en-US" sz="1400" dirty="0">
+              <a:solidFill>
+                <a:srgbClr val="000000"/>
+              </a:solidFill>
+              <a:highlight>
+                <a:srgbClr val="FFFFFF"/>
+              </a:highlight>
+              <a:latin typeface="Consolas" panose="020B0609020204030204" pitchFamily="49" charset="0"/>
+            </a:endParaRPr>
+          </a:p>
+          <a:p>
+            <a:pPr marL="0" indent="0">
+              <a:buNone/>
+            </a:pPr>
+            <a:r>
+              <a:rPr lang="en-US" sz="1400" dirty="0">
+                <a:solidFill>
+                  <a:srgbClr val="000000"/>
+                </a:solidFill>
+                <a:highlight>
+                  <a:srgbClr val="FFFFFF"/>
+                </a:highlight>
+                <a:latin typeface="Consolas" panose="020B0609020204030204" pitchFamily="49" charset="0"/>
+              </a:rPr>
+              <a:t>            {</a:t>
+            </a:r>
+          </a:p>
+          <a:p>
+            <a:pPr marL="0" indent="0">
+              <a:buNone/>
+            </a:pPr>
+            <a:r>
+              <a:rPr lang="pt-BR" sz="1400" dirty="0">
+                <a:solidFill>
+                  <a:srgbClr val="000000"/>
+                </a:solidFill>
+                <a:highlight>
+                  <a:srgbClr val="FFFFFF"/>
+                </a:highlight>
+                <a:latin typeface="Consolas" panose="020B0609020204030204" pitchFamily="49" charset="0"/>
+              </a:rPr>
+              <a:t>                </a:t>
+            </a:r>
+            <a:r>
+              <a:rPr lang="pt-BR" sz="1400" dirty="0">
+                <a:solidFill>
+                  <a:srgbClr val="008000"/>
+                </a:solidFill>
+                <a:highlight>
+                  <a:srgbClr val="FFFFFF"/>
+                </a:highlight>
+                <a:latin typeface="Consolas" panose="020B0609020204030204" pitchFamily="49" charset="0"/>
+              </a:rPr>
+              <a:t>// Tenta executar bloco de código</a:t>
+            </a:r>
+            <a:endParaRPr lang="pt-BR" sz="1400" dirty="0">
+              <a:solidFill>
+                <a:srgbClr val="000000"/>
+              </a:solidFill>
+              <a:highlight>
+                <a:srgbClr val="FFFFFF"/>
+              </a:highlight>
+              <a:latin typeface="Consolas" panose="020B0609020204030204" pitchFamily="49" charset="0"/>
+            </a:endParaRPr>
+          </a:p>
+          <a:p>
+            <a:pPr marL="0" indent="0">
+              <a:buNone/>
+            </a:pPr>
+            <a:r>
+              <a:rPr lang="en-US" sz="1400" dirty="0">
+                <a:solidFill>
+                  <a:srgbClr val="000000"/>
+                </a:solidFill>
+                <a:highlight>
+                  <a:srgbClr val="FFFFFF"/>
+                </a:highlight>
+                <a:latin typeface="Consolas" panose="020B0609020204030204" pitchFamily="49" charset="0"/>
+              </a:rPr>
+              <a:t>            }</a:t>
+            </a:r>
+          </a:p>
+          <a:p>
+            <a:pPr marL="0" indent="0">
+              <a:buNone/>
+            </a:pPr>
+            <a:r>
+              <a:rPr lang="en-US" sz="1400" dirty="0">
+                <a:solidFill>
+                  <a:srgbClr val="000000"/>
+                </a:solidFill>
+                <a:highlight>
+                  <a:srgbClr val="FFFFFF"/>
+                </a:highlight>
+                <a:latin typeface="Consolas" panose="020B0609020204030204" pitchFamily="49" charset="0"/>
+              </a:rPr>
+              <a:t>            </a:t>
+            </a:r>
+            <a:r>
+              <a:rPr lang="en-US" sz="1400" dirty="0">
+                <a:solidFill>
+                  <a:srgbClr val="0000FF"/>
+                </a:solidFill>
+                <a:highlight>
+                  <a:srgbClr val="FFFFFF"/>
+                </a:highlight>
+                <a:latin typeface="Consolas" panose="020B0609020204030204" pitchFamily="49" charset="0"/>
+              </a:rPr>
+              <a:t>catch</a:t>
+            </a:r>
+            <a:endParaRPr lang="en-US" sz="1400" dirty="0">
+              <a:solidFill>
+                <a:srgbClr val="000000"/>
+              </a:solidFill>
+              <a:highlight>
+                <a:srgbClr val="FFFFFF"/>
+              </a:highlight>
+              <a:latin typeface="Consolas" panose="020B0609020204030204" pitchFamily="49" charset="0"/>
+            </a:endParaRPr>
+          </a:p>
+          <a:p>
+            <a:pPr marL="0" indent="0">
+              <a:buNone/>
+            </a:pPr>
+            <a:r>
+              <a:rPr lang="en-US" sz="1400" dirty="0">
+                <a:solidFill>
+                  <a:srgbClr val="000000"/>
+                </a:solidFill>
+                <a:highlight>
+                  <a:srgbClr val="FFFFFF"/>
+                </a:highlight>
+                <a:latin typeface="Consolas" panose="020B0609020204030204" pitchFamily="49" charset="0"/>
+              </a:rPr>
+              <a:t>            {</a:t>
+            </a:r>
+          </a:p>
+          <a:p>
+            <a:pPr marL="0" indent="0">
+              <a:buNone/>
+            </a:pPr>
+            <a:r>
+              <a:rPr lang="pt-BR" sz="1400" dirty="0">
+                <a:solidFill>
+                  <a:srgbClr val="000000"/>
+                </a:solidFill>
+                <a:highlight>
+                  <a:srgbClr val="FFFFFF"/>
+                </a:highlight>
+                <a:latin typeface="Consolas" panose="020B0609020204030204" pitchFamily="49" charset="0"/>
+              </a:rPr>
+              <a:t>                </a:t>
+            </a:r>
+            <a:r>
+              <a:rPr lang="pt-BR" sz="1400" dirty="0">
+                <a:solidFill>
+                  <a:srgbClr val="008000"/>
+                </a:solidFill>
+                <a:highlight>
+                  <a:srgbClr val="FFFFFF"/>
+                </a:highlight>
+                <a:latin typeface="Consolas" panose="020B0609020204030204" pitchFamily="49" charset="0"/>
+              </a:rPr>
+              <a:t>// Executa esse bloco de código em caso de algum erro</a:t>
+            </a:r>
+            <a:endParaRPr lang="pt-BR" sz="1400" dirty="0">
+              <a:solidFill>
+                <a:srgbClr val="000000"/>
+              </a:solidFill>
+              <a:highlight>
+                <a:srgbClr val="FFFFFF"/>
+              </a:highlight>
+              <a:latin typeface="Consolas" panose="020B0609020204030204" pitchFamily="49" charset="0"/>
+            </a:endParaRPr>
+          </a:p>
+          <a:p>
+            <a:pPr marL="0" indent="0">
+              <a:buNone/>
+            </a:pPr>
+            <a:r>
+              <a:rPr lang="en-US" sz="1400" dirty="0">
+                <a:solidFill>
+                  <a:srgbClr val="000000"/>
+                </a:solidFill>
+                <a:highlight>
+                  <a:srgbClr val="FFFFFF"/>
+                </a:highlight>
+                <a:latin typeface="Consolas" panose="020B0609020204030204" pitchFamily="49" charset="0"/>
+              </a:rPr>
+              <a:t>            }</a:t>
+            </a:r>
+          </a:p>
+          <a:p>
+            <a:pPr marL="0" indent="0">
+              <a:buNone/>
+            </a:pPr>
+            <a:r>
+              <a:rPr lang="en-US" sz="1400" dirty="0">
+                <a:solidFill>
+                  <a:srgbClr val="000000"/>
+                </a:solidFill>
+                <a:highlight>
+                  <a:srgbClr val="FFFFFF"/>
+                </a:highlight>
+                <a:latin typeface="Consolas" panose="020B0609020204030204" pitchFamily="49" charset="0"/>
+              </a:rPr>
+              <a:t>            </a:t>
+            </a:r>
+            <a:r>
+              <a:rPr lang="en-US" sz="1400" dirty="0" smtClean="0">
+                <a:solidFill>
+                  <a:srgbClr val="0000FF"/>
+                </a:solidFill>
+                <a:highlight>
+                  <a:srgbClr val="FFFFFF"/>
+                </a:highlight>
+                <a:latin typeface="Consolas" panose="020B0609020204030204" pitchFamily="49" charset="0"/>
+              </a:rPr>
+              <a:t>finally </a:t>
+            </a:r>
+            <a:r>
+              <a:rPr lang="pt-BR" sz="1400" dirty="0">
+                <a:solidFill>
+                  <a:srgbClr val="008000"/>
+                </a:solidFill>
+                <a:highlight>
+                  <a:srgbClr val="FFFFFF"/>
+                </a:highlight>
+                <a:latin typeface="Consolas" panose="020B0609020204030204" pitchFamily="49" charset="0"/>
+              </a:rPr>
+              <a:t>// </a:t>
+            </a:r>
+            <a:r>
+              <a:rPr lang="pt-BR" sz="1400" dirty="0" smtClean="0">
+                <a:solidFill>
+                  <a:srgbClr val="008000"/>
+                </a:solidFill>
+                <a:highlight>
+                  <a:srgbClr val="FFFFFF"/>
+                </a:highlight>
+                <a:latin typeface="Consolas" panose="020B0609020204030204" pitchFamily="49" charset="0"/>
+              </a:rPr>
+              <a:t>(Opcional)</a:t>
+            </a:r>
+            <a:endParaRPr lang="en-US" sz="1400" dirty="0">
+              <a:solidFill>
+                <a:srgbClr val="000000"/>
+              </a:solidFill>
+              <a:highlight>
+                <a:srgbClr val="FFFFFF"/>
+              </a:highlight>
+              <a:latin typeface="Consolas" panose="020B0609020204030204" pitchFamily="49" charset="0"/>
+            </a:endParaRPr>
+          </a:p>
+          <a:p>
+            <a:pPr marL="0" indent="0">
+              <a:buNone/>
+            </a:pPr>
+            <a:r>
+              <a:rPr lang="en-US" sz="1400" dirty="0">
+                <a:solidFill>
+                  <a:srgbClr val="000000"/>
+                </a:solidFill>
+                <a:highlight>
+                  <a:srgbClr val="FFFFFF"/>
+                </a:highlight>
+                <a:latin typeface="Consolas" panose="020B0609020204030204" pitchFamily="49" charset="0"/>
+              </a:rPr>
+              <a:t>            {</a:t>
+            </a:r>
+          </a:p>
+          <a:p>
+            <a:pPr marL="0" indent="0">
+              <a:buNone/>
+            </a:pPr>
+            <a:r>
+              <a:rPr lang="pt-BR" sz="1400" dirty="0">
+                <a:solidFill>
+                  <a:srgbClr val="000000"/>
+                </a:solidFill>
+                <a:highlight>
+                  <a:srgbClr val="FFFFFF"/>
+                </a:highlight>
+                <a:latin typeface="Consolas" panose="020B0609020204030204" pitchFamily="49" charset="0"/>
+              </a:rPr>
+              <a:t>                </a:t>
+            </a:r>
+            <a:r>
+              <a:rPr lang="pt-BR" sz="1400" dirty="0">
+                <a:solidFill>
+                  <a:srgbClr val="008000"/>
+                </a:solidFill>
+                <a:highlight>
+                  <a:srgbClr val="FFFFFF"/>
+                </a:highlight>
+                <a:latin typeface="Consolas" panose="020B0609020204030204" pitchFamily="49" charset="0"/>
+              </a:rPr>
+              <a:t>// </a:t>
+            </a:r>
+            <a:r>
+              <a:rPr lang="pt-BR" sz="1400" dirty="0" smtClean="0">
+                <a:solidFill>
+                  <a:srgbClr val="008000"/>
+                </a:solidFill>
+                <a:highlight>
+                  <a:srgbClr val="FFFFFF"/>
+                </a:highlight>
+                <a:latin typeface="Consolas" panose="020B0609020204030204" pitchFamily="49" charset="0"/>
+              </a:rPr>
+              <a:t>Executa </a:t>
+            </a:r>
+            <a:r>
+              <a:rPr lang="pt-BR" sz="1400" dirty="0">
+                <a:solidFill>
+                  <a:srgbClr val="008000"/>
+                </a:solidFill>
+                <a:highlight>
+                  <a:srgbClr val="FFFFFF"/>
+                </a:highlight>
+                <a:latin typeface="Consolas" panose="020B0609020204030204" pitchFamily="49" charset="0"/>
+              </a:rPr>
+              <a:t>bloco de código independente da existência de erro.</a:t>
+            </a:r>
+            <a:endParaRPr lang="pt-BR" sz="1400" dirty="0">
+              <a:solidFill>
+                <a:srgbClr val="000000"/>
+              </a:solidFill>
+              <a:highlight>
+                <a:srgbClr val="FFFFFF"/>
+              </a:highlight>
+              <a:latin typeface="Consolas" panose="020B0609020204030204" pitchFamily="49" charset="0"/>
+            </a:endParaRPr>
+          </a:p>
+          <a:p>
+            <a:pPr marL="0" indent="0">
+              <a:buNone/>
+            </a:pPr>
+            <a:r>
+              <a:rPr lang="pt-BR" sz="1400" dirty="0">
+                <a:solidFill>
+                  <a:srgbClr val="000000"/>
+                </a:solidFill>
+                <a:highlight>
+                  <a:srgbClr val="FFFFFF"/>
+                </a:highlight>
+                <a:latin typeface="Consolas" panose="020B0609020204030204" pitchFamily="49" charset="0"/>
+              </a:rPr>
+              <a:t>                </a:t>
+            </a:r>
+            <a:r>
+              <a:rPr lang="pt-BR" sz="1400" dirty="0">
+                <a:solidFill>
+                  <a:srgbClr val="008000"/>
+                </a:solidFill>
+                <a:highlight>
+                  <a:srgbClr val="FFFFFF"/>
+                </a:highlight>
+                <a:latin typeface="Consolas" panose="020B0609020204030204" pitchFamily="49" charset="0"/>
+              </a:rPr>
+              <a:t>// Útil para fechar arquivos de leitura, banco de dados, etc.</a:t>
+            </a:r>
+            <a:endParaRPr lang="pt-BR" sz="1400" dirty="0">
+              <a:solidFill>
+                <a:srgbClr val="000000"/>
+              </a:solidFill>
+              <a:highlight>
+                <a:srgbClr val="FFFFFF"/>
+              </a:highlight>
+              <a:latin typeface="Consolas" panose="020B0609020204030204" pitchFamily="49" charset="0"/>
+            </a:endParaRPr>
+          </a:p>
+          <a:p>
+            <a:pPr marL="0" indent="0">
+              <a:buNone/>
+            </a:pPr>
+            <a:r>
+              <a:rPr lang="en-US" sz="1400" dirty="0">
+                <a:solidFill>
+                  <a:srgbClr val="000000"/>
+                </a:solidFill>
+                <a:highlight>
+                  <a:srgbClr val="FFFFFF"/>
+                </a:highlight>
+                <a:latin typeface="Consolas" panose="020B0609020204030204" pitchFamily="49" charset="0"/>
+              </a:rPr>
+              <a:t>            }</a:t>
+            </a:r>
+            <a:endParaRPr lang="pt-BR" sz="1400" i="1" dirty="0" smtClean="0">
+              <a:latin typeface="Consolas" panose="020B0609020204030204" pitchFamily="49" charset="0"/>
+              <a:cs typeface="Segoe UI Light" panose="020B0502040204020203" pitchFamily="34" charset="0"/>
+            </a:endParaRPr>
+          </a:p>
+        </p:txBody>
+      </p:sp>
+    </p:spTree>
+    <p:extLst>
+      <p:ext uri="{BB962C8B-B14F-4D97-AF65-F5344CB8AC3E}">
+        <p14:creationId xmlns:p14="http://schemas.microsoft.com/office/powerpoint/2010/main" val="2107920827"/>
       </p:ext>
     </p:extLst>
   </p:cSld>
@@ -8226,10 +8200,697 @@
                 <a:latin typeface="Segoe UI Light" panose="020B0502040204020203" pitchFamily="34" charset="0"/>
                 <a:cs typeface="Segoe UI Light" panose="020B0502040204020203" pitchFamily="34" charset="0"/>
               </a:rPr>
-              <a:t>É sempre bom produzir código que esteja imune a erros. Para isso, </a:t>
-            </a:r>
-            <a:endParaRPr lang="pt-BR" sz="1600" i="1" dirty="0" smtClean="0">
-              <a:latin typeface="Segoe UI Light" panose="020B0502040204020203" pitchFamily="34" charset="0"/>
+              <a:t>Podemos definir diferentes blocos de código a ser executado para diferentes tipos de erros/exceções</a:t>
+            </a:r>
+            <a:r>
+              <a:rPr lang="pt-BR" dirty="0" smtClean="0">
+                <a:latin typeface="Segoe UI Light" panose="020B0502040204020203" pitchFamily="34" charset="0"/>
+                <a:cs typeface="Segoe UI Light" panose="020B0502040204020203" pitchFamily="34" charset="0"/>
+              </a:rPr>
+              <a:t>:</a:t>
+            </a:r>
+            <a:endParaRPr lang="en-US" sz="1400" dirty="0">
+              <a:solidFill>
+                <a:srgbClr val="000000"/>
+              </a:solidFill>
+              <a:highlight>
+                <a:srgbClr val="FFFFFF"/>
+              </a:highlight>
+              <a:latin typeface="Consolas" panose="020B0609020204030204" pitchFamily="49" charset="0"/>
+            </a:endParaRPr>
+          </a:p>
+          <a:p>
+            <a:pPr marL="0" indent="0">
+              <a:buNone/>
+            </a:pPr>
+            <a:r>
+              <a:rPr lang="en-US" sz="1400" dirty="0">
+                <a:solidFill>
+                  <a:srgbClr val="000000"/>
+                </a:solidFill>
+                <a:highlight>
+                  <a:srgbClr val="FFFFFF"/>
+                </a:highlight>
+                <a:latin typeface="Consolas" panose="020B0609020204030204" pitchFamily="49" charset="0"/>
+              </a:rPr>
+              <a:t>            </a:t>
+            </a:r>
+            <a:r>
+              <a:rPr lang="en-US" sz="1400" dirty="0">
+                <a:solidFill>
+                  <a:srgbClr val="0000FF"/>
+                </a:solidFill>
+                <a:highlight>
+                  <a:srgbClr val="FFFFFF"/>
+                </a:highlight>
+                <a:latin typeface="Consolas" panose="020B0609020204030204" pitchFamily="49" charset="0"/>
+              </a:rPr>
+              <a:t>try</a:t>
+            </a:r>
+            <a:endParaRPr lang="en-US" sz="1400" dirty="0">
+              <a:solidFill>
+                <a:srgbClr val="000000"/>
+              </a:solidFill>
+              <a:highlight>
+                <a:srgbClr val="FFFFFF"/>
+              </a:highlight>
+              <a:latin typeface="Consolas" panose="020B0609020204030204" pitchFamily="49" charset="0"/>
+            </a:endParaRPr>
+          </a:p>
+          <a:p>
+            <a:pPr marL="0" indent="0">
+              <a:buNone/>
+            </a:pPr>
+            <a:r>
+              <a:rPr lang="en-US" sz="1400" dirty="0">
+                <a:solidFill>
+                  <a:srgbClr val="000000"/>
+                </a:solidFill>
+                <a:highlight>
+                  <a:srgbClr val="FFFFFF"/>
+                </a:highlight>
+                <a:latin typeface="Consolas" panose="020B0609020204030204" pitchFamily="49" charset="0"/>
+              </a:rPr>
+              <a:t>            {</a:t>
+            </a:r>
+          </a:p>
+          <a:p>
+            <a:pPr marL="0" indent="0">
+              <a:buNone/>
+            </a:pPr>
+            <a:r>
+              <a:rPr lang="en-US" sz="1400" dirty="0">
+                <a:solidFill>
+                  <a:srgbClr val="000000"/>
+                </a:solidFill>
+                <a:highlight>
+                  <a:srgbClr val="FFFFFF"/>
+                </a:highlight>
+                <a:latin typeface="Consolas" panose="020B0609020204030204" pitchFamily="49" charset="0"/>
+              </a:rPr>
+              <a:t>                </a:t>
+            </a:r>
+            <a:r>
+              <a:rPr lang="en-US" sz="1400" dirty="0">
+                <a:solidFill>
+                  <a:srgbClr val="0000FF"/>
+                </a:solidFill>
+                <a:highlight>
+                  <a:srgbClr val="FFFFFF"/>
+                </a:highlight>
+                <a:latin typeface="Consolas" panose="020B0609020204030204" pitchFamily="49" charset="0"/>
+              </a:rPr>
+              <a:t>string</a:t>
+            </a:r>
+            <a:r>
+              <a:rPr lang="en-US" sz="1400" dirty="0">
+                <a:solidFill>
+                  <a:srgbClr val="000000"/>
+                </a:solidFill>
+                <a:highlight>
+                  <a:srgbClr val="FFFFFF"/>
+                </a:highlight>
+                <a:latin typeface="Consolas" panose="020B0609020204030204" pitchFamily="49" charset="0"/>
+              </a:rPr>
+              <a:t> entrada = </a:t>
+            </a:r>
+            <a:r>
+              <a:rPr lang="en-US" sz="1400" dirty="0" err="1">
+                <a:solidFill>
+                  <a:srgbClr val="2B91AF"/>
+                </a:solidFill>
+                <a:highlight>
+                  <a:srgbClr val="FFFFFF"/>
+                </a:highlight>
+                <a:latin typeface="Consolas" panose="020B0609020204030204" pitchFamily="49" charset="0"/>
+              </a:rPr>
+              <a:t>Console</a:t>
+            </a:r>
+            <a:r>
+              <a:rPr lang="en-US" sz="1400" dirty="0" err="1">
+                <a:solidFill>
+                  <a:srgbClr val="000000"/>
+                </a:solidFill>
+                <a:highlight>
+                  <a:srgbClr val="FFFFFF"/>
+                </a:highlight>
+                <a:latin typeface="Consolas" panose="020B0609020204030204" pitchFamily="49" charset="0"/>
+              </a:rPr>
+              <a:t>.ReadLine</a:t>
+            </a:r>
+            <a:r>
+              <a:rPr lang="en-US" sz="1400" dirty="0">
+                <a:solidFill>
+                  <a:srgbClr val="000000"/>
+                </a:solidFill>
+                <a:highlight>
+                  <a:srgbClr val="FFFFFF"/>
+                </a:highlight>
+                <a:latin typeface="Consolas" panose="020B0609020204030204" pitchFamily="49" charset="0"/>
+              </a:rPr>
+              <a:t>();</a:t>
+            </a:r>
+          </a:p>
+          <a:p>
+            <a:pPr marL="0" indent="0">
+              <a:buNone/>
+            </a:pPr>
+            <a:r>
+              <a:rPr lang="en-US" sz="1400" dirty="0">
+                <a:solidFill>
+                  <a:srgbClr val="000000"/>
+                </a:solidFill>
+                <a:highlight>
+                  <a:srgbClr val="FFFFFF"/>
+                </a:highlight>
+                <a:latin typeface="Consolas" panose="020B0609020204030204" pitchFamily="49" charset="0"/>
+              </a:rPr>
+              <a:t>                </a:t>
+            </a:r>
+            <a:r>
+              <a:rPr lang="en-US" sz="1400" dirty="0">
+                <a:solidFill>
+                  <a:srgbClr val="2B91AF"/>
+                </a:solidFill>
+                <a:highlight>
+                  <a:srgbClr val="FFFFFF"/>
+                </a:highlight>
+                <a:latin typeface="Consolas" panose="020B0609020204030204" pitchFamily="49" charset="0"/>
+              </a:rPr>
+              <a:t>Convert</a:t>
+            </a:r>
+            <a:r>
+              <a:rPr lang="en-US" sz="1400" dirty="0">
+                <a:solidFill>
+                  <a:srgbClr val="000000"/>
+                </a:solidFill>
+                <a:highlight>
+                  <a:srgbClr val="FFFFFF"/>
+                </a:highlight>
+                <a:latin typeface="Consolas" panose="020B0609020204030204" pitchFamily="49" charset="0"/>
+              </a:rPr>
+              <a:t>.ToInt32(entrada</a:t>
+            </a:r>
+            <a:r>
+              <a:rPr lang="en-US" sz="1400" dirty="0" smtClean="0">
+                <a:solidFill>
+                  <a:srgbClr val="000000"/>
+                </a:solidFill>
+                <a:highlight>
+                  <a:srgbClr val="FFFFFF"/>
+                </a:highlight>
+                <a:latin typeface="Consolas" panose="020B0609020204030204" pitchFamily="49" charset="0"/>
+              </a:rPr>
+              <a:t>);</a:t>
+            </a:r>
+            <a:r>
+              <a:rPr lang="pt-BR" sz="1400" dirty="0">
+                <a:solidFill>
+                  <a:srgbClr val="000000"/>
+                </a:solidFill>
+                <a:highlight>
+                  <a:srgbClr val="FFFFFF"/>
+                </a:highlight>
+                <a:latin typeface="Consolas" panose="020B0609020204030204" pitchFamily="49" charset="0"/>
+              </a:rPr>
+              <a:t> </a:t>
+            </a:r>
+            <a:r>
+              <a:rPr lang="pt-BR" sz="1400" dirty="0">
+                <a:solidFill>
+                  <a:srgbClr val="008000"/>
+                </a:solidFill>
+                <a:highlight>
+                  <a:srgbClr val="FFFFFF"/>
+                </a:highlight>
+                <a:latin typeface="Consolas" panose="020B0609020204030204" pitchFamily="49" charset="0"/>
+              </a:rPr>
+              <a:t>// Converte string para tipo inteiro, se possível</a:t>
+            </a:r>
+            <a:endParaRPr lang="en-US" sz="1400" dirty="0">
+              <a:solidFill>
+                <a:srgbClr val="000000"/>
+              </a:solidFill>
+              <a:highlight>
+                <a:srgbClr val="FFFFFF"/>
+              </a:highlight>
+              <a:latin typeface="Consolas" panose="020B0609020204030204" pitchFamily="49" charset="0"/>
+            </a:endParaRPr>
+          </a:p>
+          <a:p>
+            <a:pPr marL="0" indent="0">
+              <a:buNone/>
+            </a:pPr>
+            <a:r>
+              <a:rPr lang="en-US" sz="1400" dirty="0">
+                <a:solidFill>
+                  <a:srgbClr val="000000"/>
+                </a:solidFill>
+                <a:highlight>
+                  <a:srgbClr val="FFFFFF"/>
+                </a:highlight>
+                <a:latin typeface="Consolas" panose="020B0609020204030204" pitchFamily="49" charset="0"/>
+              </a:rPr>
+              <a:t>            }</a:t>
+            </a:r>
+          </a:p>
+          <a:p>
+            <a:pPr marL="0" indent="0">
+              <a:buNone/>
+            </a:pPr>
+            <a:r>
+              <a:rPr lang="en-US" sz="1400" dirty="0">
+                <a:solidFill>
+                  <a:srgbClr val="000000"/>
+                </a:solidFill>
+                <a:highlight>
+                  <a:srgbClr val="FFFFFF"/>
+                </a:highlight>
+                <a:latin typeface="Consolas" panose="020B0609020204030204" pitchFamily="49" charset="0"/>
+              </a:rPr>
+              <a:t>            </a:t>
+            </a:r>
+            <a:r>
+              <a:rPr lang="en-US" sz="1400" dirty="0">
+                <a:solidFill>
+                  <a:srgbClr val="0000FF"/>
+                </a:solidFill>
+                <a:highlight>
+                  <a:srgbClr val="FFFFFF"/>
+                </a:highlight>
+                <a:latin typeface="Consolas" panose="020B0609020204030204" pitchFamily="49" charset="0"/>
+              </a:rPr>
+              <a:t>catch</a:t>
+            </a:r>
+            <a:r>
+              <a:rPr lang="en-US" sz="1400" dirty="0">
+                <a:solidFill>
+                  <a:srgbClr val="000000"/>
+                </a:solidFill>
+                <a:highlight>
+                  <a:srgbClr val="FFFFFF"/>
+                </a:highlight>
+                <a:latin typeface="Consolas" panose="020B0609020204030204" pitchFamily="49" charset="0"/>
+              </a:rPr>
+              <a:t> (</a:t>
+            </a:r>
+            <a:r>
+              <a:rPr lang="en-US" sz="1400" dirty="0" err="1">
+                <a:solidFill>
+                  <a:srgbClr val="2B91AF"/>
+                </a:solidFill>
+                <a:highlight>
+                  <a:srgbClr val="FFFFFF"/>
+                </a:highlight>
+                <a:latin typeface="Consolas" panose="020B0609020204030204" pitchFamily="49" charset="0"/>
+              </a:rPr>
+              <a:t>FormatException</a:t>
+            </a:r>
+            <a:r>
+              <a:rPr lang="en-US" sz="1400" dirty="0">
+                <a:solidFill>
+                  <a:srgbClr val="000000"/>
+                </a:solidFill>
+                <a:highlight>
+                  <a:srgbClr val="FFFFFF"/>
+                </a:highlight>
+                <a:latin typeface="Consolas" panose="020B0609020204030204" pitchFamily="49" charset="0"/>
+              </a:rPr>
+              <a:t> </a:t>
+            </a:r>
+            <a:r>
+              <a:rPr lang="en-US" sz="1400" dirty="0" err="1">
+                <a:solidFill>
+                  <a:srgbClr val="000000"/>
+                </a:solidFill>
+                <a:highlight>
+                  <a:srgbClr val="FFFFFF"/>
+                </a:highlight>
+                <a:latin typeface="Consolas" panose="020B0609020204030204" pitchFamily="49" charset="0"/>
+              </a:rPr>
+              <a:t>excecao</a:t>
+            </a:r>
+            <a:r>
+              <a:rPr lang="en-US" sz="1400" dirty="0">
+                <a:solidFill>
+                  <a:srgbClr val="000000"/>
+                </a:solidFill>
+                <a:highlight>
+                  <a:srgbClr val="FFFFFF"/>
+                </a:highlight>
+                <a:latin typeface="Consolas" panose="020B0609020204030204" pitchFamily="49" charset="0"/>
+              </a:rPr>
+              <a:t>)</a:t>
+            </a:r>
+          </a:p>
+          <a:p>
+            <a:pPr marL="0" indent="0">
+              <a:buNone/>
+            </a:pPr>
+            <a:r>
+              <a:rPr lang="en-US" sz="1400" dirty="0">
+                <a:solidFill>
+                  <a:srgbClr val="000000"/>
+                </a:solidFill>
+                <a:highlight>
+                  <a:srgbClr val="FFFFFF"/>
+                </a:highlight>
+                <a:latin typeface="Consolas" panose="020B0609020204030204" pitchFamily="49" charset="0"/>
+              </a:rPr>
+              <a:t>            {</a:t>
+            </a:r>
+          </a:p>
+          <a:p>
+            <a:pPr marL="0" indent="0">
+              <a:buNone/>
+            </a:pPr>
+            <a:r>
+              <a:rPr lang="pt-BR" sz="1400" dirty="0">
+                <a:solidFill>
+                  <a:srgbClr val="000000"/>
+                </a:solidFill>
+                <a:highlight>
+                  <a:srgbClr val="FFFFFF"/>
+                </a:highlight>
+                <a:latin typeface="Consolas" panose="020B0609020204030204" pitchFamily="49" charset="0"/>
+              </a:rPr>
+              <a:t>                </a:t>
+            </a:r>
+            <a:r>
+              <a:rPr lang="pt-BR" sz="1400" dirty="0">
+                <a:solidFill>
+                  <a:srgbClr val="2B91AF"/>
+                </a:solidFill>
+                <a:highlight>
+                  <a:srgbClr val="FFFFFF"/>
+                </a:highlight>
+                <a:latin typeface="Consolas" panose="020B0609020204030204" pitchFamily="49" charset="0"/>
+              </a:rPr>
+              <a:t>Console</a:t>
+            </a:r>
+            <a:r>
+              <a:rPr lang="pt-BR" sz="1400" dirty="0">
+                <a:solidFill>
+                  <a:srgbClr val="000000"/>
+                </a:solidFill>
+                <a:highlight>
+                  <a:srgbClr val="FFFFFF"/>
+                </a:highlight>
+                <a:latin typeface="Consolas" panose="020B0609020204030204" pitchFamily="49" charset="0"/>
+              </a:rPr>
+              <a:t>.WriteLine(</a:t>
+            </a:r>
+            <a:r>
+              <a:rPr lang="pt-BR" sz="1400" dirty="0">
+                <a:solidFill>
+                  <a:srgbClr val="A31515"/>
+                </a:solidFill>
+                <a:highlight>
+                  <a:srgbClr val="FFFFFF"/>
+                </a:highlight>
+                <a:latin typeface="Consolas" panose="020B0609020204030204" pitchFamily="49" charset="0"/>
+              </a:rPr>
+              <a:t>"Erro na formatação: "</a:t>
+            </a:r>
+            <a:r>
+              <a:rPr lang="pt-BR" sz="1400" dirty="0">
+                <a:solidFill>
+                  <a:srgbClr val="000000"/>
+                </a:solidFill>
+                <a:highlight>
+                  <a:srgbClr val="FFFFFF"/>
+                </a:highlight>
+                <a:latin typeface="Consolas" panose="020B0609020204030204" pitchFamily="49" charset="0"/>
+              </a:rPr>
+              <a:t> + excecao.Message);</a:t>
+            </a:r>
+          </a:p>
+          <a:p>
+            <a:pPr marL="0" indent="0">
+              <a:buNone/>
+            </a:pPr>
+            <a:r>
+              <a:rPr lang="en-US" sz="1400" dirty="0">
+                <a:solidFill>
+                  <a:srgbClr val="000000"/>
+                </a:solidFill>
+                <a:highlight>
+                  <a:srgbClr val="FFFFFF"/>
+                </a:highlight>
+                <a:latin typeface="Consolas" panose="020B0609020204030204" pitchFamily="49" charset="0"/>
+              </a:rPr>
+              <a:t>            }</a:t>
+            </a:r>
+          </a:p>
+          <a:p>
+            <a:pPr marL="0" indent="0">
+              <a:buNone/>
+            </a:pPr>
+            <a:r>
+              <a:rPr lang="en-US" sz="1400" dirty="0">
+                <a:solidFill>
+                  <a:srgbClr val="000000"/>
+                </a:solidFill>
+                <a:highlight>
+                  <a:srgbClr val="FFFFFF"/>
+                </a:highlight>
+                <a:latin typeface="Consolas" panose="020B0609020204030204" pitchFamily="49" charset="0"/>
+              </a:rPr>
+              <a:t>            </a:t>
+            </a:r>
+            <a:r>
+              <a:rPr lang="en-US" sz="1400" dirty="0">
+                <a:solidFill>
+                  <a:srgbClr val="0000FF"/>
+                </a:solidFill>
+                <a:highlight>
+                  <a:srgbClr val="FFFFFF"/>
+                </a:highlight>
+                <a:latin typeface="Consolas" panose="020B0609020204030204" pitchFamily="49" charset="0"/>
+              </a:rPr>
+              <a:t>catch</a:t>
+            </a:r>
+            <a:r>
+              <a:rPr lang="en-US" sz="1400" dirty="0">
+                <a:solidFill>
+                  <a:srgbClr val="000000"/>
+                </a:solidFill>
+                <a:highlight>
+                  <a:srgbClr val="FFFFFF"/>
+                </a:highlight>
+                <a:latin typeface="Consolas" panose="020B0609020204030204" pitchFamily="49" charset="0"/>
+              </a:rPr>
+              <a:t> (</a:t>
+            </a:r>
+            <a:r>
+              <a:rPr lang="en-US" sz="1400" dirty="0">
+                <a:solidFill>
+                  <a:srgbClr val="2B91AF"/>
+                </a:solidFill>
+                <a:highlight>
+                  <a:srgbClr val="FFFFFF"/>
+                </a:highlight>
+                <a:latin typeface="Consolas" panose="020B0609020204030204" pitchFamily="49" charset="0"/>
+              </a:rPr>
+              <a:t>Exception</a:t>
+            </a:r>
+            <a:r>
+              <a:rPr lang="en-US" sz="1400" dirty="0">
+                <a:solidFill>
+                  <a:srgbClr val="000000"/>
+                </a:solidFill>
+                <a:highlight>
+                  <a:srgbClr val="FFFFFF"/>
+                </a:highlight>
+                <a:latin typeface="Consolas" panose="020B0609020204030204" pitchFamily="49" charset="0"/>
+              </a:rPr>
+              <a:t> </a:t>
+            </a:r>
+            <a:r>
+              <a:rPr lang="en-US" sz="1400" dirty="0" err="1">
+                <a:solidFill>
+                  <a:srgbClr val="000000"/>
+                </a:solidFill>
+                <a:highlight>
+                  <a:srgbClr val="FFFFFF"/>
+                </a:highlight>
+                <a:latin typeface="Consolas" panose="020B0609020204030204" pitchFamily="49" charset="0"/>
+              </a:rPr>
+              <a:t>excecao</a:t>
+            </a:r>
+            <a:r>
+              <a:rPr lang="en-US" sz="1400" dirty="0">
+                <a:solidFill>
+                  <a:srgbClr val="000000"/>
+                </a:solidFill>
+                <a:highlight>
+                  <a:srgbClr val="FFFFFF"/>
+                </a:highlight>
+                <a:latin typeface="Consolas" panose="020B0609020204030204" pitchFamily="49" charset="0"/>
+              </a:rPr>
+              <a:t>)</a:t>
+            </a:r>
+          </a:p>
+          <a:p>
+            <a:pPr marL="0" indent="0">
+              <a:buNone/>
+            </a:pPr>
+            <a:r>
+              <a:rPr lang="en-US" sz="1400" dirty="0">
+                <a:solidFill>
+                  <a:srgbClr val="000000"/>
+                </a:solidFill>
+                <a:highlight>
+                  <a:srgbClr val="FFFFFF"/>
+                </a:highlight>
+                <a:latin typeface="Consolas" panose="020B0609020204030204" pitchFamily="49" charset="0"/>
+              </a:rPr>
+              <a:t>            {</a:t>
+            </a:r>
+          </a:p>
+          <a:p>
+            <a:pPr marL="0" indent="0">
+              <a:buNone/>
+            </a:pPr>
+            <a:r>
+              <a:rPr lang="en-US" sz="1400" dirty="0">
+                <a:solidFill>
+                  <a:srgbClr val="000000"/>
+                </a:solidFill>
+                <a:highlight>
+                  <a:srgbClr val="FFFFFF"/>
+                </a:highlight>
+                <a:latin typeface="Consolas" panose="020B0609020204030204" pitchFamily="49" charset="0"/>
+              </a:rPr>
+              <a:t>                </a:t>
+            </a:r>
+            <a:r>
+              <a:rPr lang="en-US" sz="1400" dirty="0" err="1">
+                <a:solidFill>
+                  <a:srgbClr val="2B91AF"/>
+                </a:solidFill>
+                <a:highlight>
+                  <a:srgbClr val="FFFFFF"/>
+                </a:highlight>
+                <a:latin typeface="Consolas" panose="020B0609020204030204" pitchFamily="49" charset="0"/>
+              </a:rPr>
+              <a:t>Console</a:t>
+            </a:r>
+            <a:r>
+              <a:rPr lang="en-US" sz="1400" dirty="0" err="1">
+                <a:solidFill>
+                  <a:srgbClr val="000000"/>
+                </a:solidFill>
+                <a:highlight>
+                  <a:srgbClr val="FFFFFF"/>
+                </a:highlight>
+                <a:latin typeface="Consolas" panose="020B0609020204030204" pitchFamily="49" charset="0"/>
+              </a:rPr>
+              <a:t>.WriteLine</a:t>
+            </a:r>
+            <a:r>
+              <a:rPr lang="en-US" sz="1400" dirty="0">
+                <a:solidFill>
+                  <a:srgbClr val="000000"/>
+                </a:solidFill>
+                <a:highlight>
+                  <a:srgbClr val="FFFFFF"/>
+                </a:highlight>
+                <a:latin typeface="Consolas" panose="020B0609020204030204" pitchFamily="49" charset="0"/>
+              </a:rPr>
+              <a:t>(</a:t>
+            </a:r>
+            <a:r>
+              <a:rPr lang="en-US" sz="1400" dirty="0">
+                <a:solidFill>
+                  <a:srgbClr val="A31515"/>
+                </a:solidFill>
+                <a:highlight>
+                  <a:srgbClr val="FFFFFF"/>
+                </a:highlight>
+                <a:latin typeface="Consolas" panose="020B0609020204030204" pitchFamily="49" charset="0"/>
+              </a:rPr>
+              <a:t>"</a:t>
+            </a:r>
+            <a:r>
+              <a:rPr lang="en-US" sz="1400" dirty="0" err="1">
+                <a:solidFill>
+                  <a:srgbClr val="A31515"/>
+                </a:solidFill>
+                <a:highlight>
+                  <a:srgbClr val="FFFFFF"/>
+                </a:highlight>
+                <a:latin typeface="Consolas" panose="020B0609020204030204" pitchFamily="49" charset="0"/>
+              </a:rPr>
+              <a:t>Erro</a:t>
+            </a:r>
+            <a:r>
+              <a:rPr lang="en-US" sz="1400" dirty="0">
+                <a:solidFill>
+                  <a:srgbClr val="A31515"/>
+                </a:solidFill>
+                <a:highlight>
+                  <a:srgbClr val="FFFFFF"/>
+                </a:highlight>
+                <a:latin typeface="Consolas" panose="020B0609020204030204" pitchFamily="49" charset="0"/>
+              </a:rPr>
+              <a:t>: "</a:t>
+            </a:r>
+            <a:r>
+              <a:rPr lang="en-US" sz="1400" dirty="0">
+                <a:solidFill>
+                  <a:srgbClr val="000000"/>
+                </a:solidFill>
+                <a:highlight>
+                  <a:srgbClr val="FFFFFF"/>
+                </a:highlight>
+                <a:latin typeface="Consolas" panose="020B0609020204030204" pitchFamily="49" charset="0"/>
+              </a:rPr>
+              <a:t> + </a:t>
+            </a:r>
+            <a:r>
+              <a:rPr lang="en-US" sz="1400" dirty="0" err="1">
+                <a:solidFill>
+                  <a:srgbClr val="000000"/>
+                </a:solidFill>
+                <a:highlight>
+                  <a:srgbClr val="FFFFFF"/>
+                </a:highlight>
+                <a:latin typeface="Consolas" panose="020B0609020204030204" pitchFamily="49" charset="0"/>
+              </a:rPr>
+              <a:t>excecao.Message</a:t>
+            </a:r>
+            <a:r>
+              <a:rPr lang="en-US" sz="1400" dirty="0">
+                <a:solidFill>
+                  <a:srgbClr val="000000"/>
+                </a:solidFill>
+                <a:highlight>
+                  <a:srgbClr val="FFFFFF"/>
+                </a:highlight>
+                <a:latin typeface="Consolas" panose="020B0609020204030204" pitchFamily="49" charset="0"/>
+              </a:rPr>
+              <a:t>);</a:t>
+            </a:r>
+          </a:p>
+          <a:p>
+            <a:pPr marL="0" indent="0">
+              <a:buNone/>
+            </a:pPr>
+            <a:r>
+              <a:rPr lang="en-US" sz="1400" dirty="0">
+                <a:solidFill>
+                  <a:srgbClr val="000000"/>
+                </a:solidFill>
+                <a:highlight>
+                  <a:srgbClr val="FFFFFF"/>
+                </a:highlight>
+                <a:latin typeface="Consolas" panose="020B0609020204030204" pitchFamily="49" charset="0"/>
+              </a:rPr>
+              <a:t>            }</a:t>
+            </a:r>
+            <a:endParaRPr lang="pt-BR" sz="1400" i="1" dirty="0" smtClean="0">
+              <a:latin typeface="Consolas" panose="020B0609020204030204" pitchFamily="49" charset="0"/>
               <a:cs typeface="Segoe UI Light" panose="020B0502040204020203" pitchFamily="34" charset="0"/>
             </a:endParaRPr>
           </a:p>
@@ -8238,7 +8899,7 @@
     </p:spTree>
     <p:extLst>
       <p:ext uri="{BB962C8B-B14F-4D97-AF65-F5344CB8AC3E}">
-        <p14:creationId xmlns:p14="http://schemas.microsoft.com/office/powerpoint/2010/main" val="2107920827"/>
+        <p14:creationId xmlns:p14="http://schemas.microsoft.com/office/powerpoint/2010/main" val="1835321565"/>
       </p:ext>
     </p:extLst>
   </p:cSld>
@@ -8777,10 +9438,6 @@
               </a:rPr>
               <a:t>”</a:t>
             </a:r>
-            <a:endParaRPr lang="pt-BR" sz="2400" dirty="0" smtClean="0">
-              <a:latin typeface="Segoe UI Light" panose="020B0502040204020203" pitchFamily="34" charset="0"/>
-              <a:cs typeface="Segoe UI Light" panose="020B0502040204020203" pitchFamily="34" charset="0"/>
-            </a:endParaRPr>
           </a:p>
         </p:txBody>
       </p:sp>
@@ -9826,652 +10483,6 @@
   <p:cSld>
     <p:spTree>
       <p:nvGrpSpPr>
-        <p:cNvPr id="1" name=""/>
-        <p:cNvGrpSpPr/>
-        <p:nvPr/>
-      </p:nvGrpSpPr>
-      <p:grpSpPr>
-        <a:xfrm>
-          <a:off x="0" y="0"/>
-          <a:ext cx="0" cy="0"/>
-          <a:chOff x="0" y="0"/>
-          <a:chExt cx="0" cy="0"/>
-        </a:xfrm>
-      </p:grpSpPr>
-      <p:sp>
-        <p:nvSpPr>
-          <p:cNvPr id="4" name="Content Placeholder 2"/>
-          <p:cNvSpPr txBox="1">
-            <a:spLocks/>
-          </p:cNvSpPr>
-          <p:nvPr/>
-        </p:nvSpPr>
-        <p:spPr>
-          <a:xfrm>
-            <a:off x="-1" y="1352282"/>
-            <a:ext cx="12191999" cy="4824681"/>
-          </a:xfrm>
-          <a:prstGeom prst="rect">
-            <a:avLst/>
-          </a:prstGeom>
-        </p:spPr>
-        <p:txBody>
-          <a:bodyPr/>
-          <a:lstStyle>
-            <a:lvl1pPr marL="228600" indent="-228600" algn="l" defTabSz="914400" rtl="0" eaLnBrk="1" latinLnBrk="0" hangingPunct="1">
-              <a:lnSpc>
-                <a:spcPct val="90000"/>
-              </a:lnSpc>
-              <a:spcBef>
-                <a:spcPts val="1000"/>
-              </a:spcBef>
-              <a:buFont typeface="Arial" panose="020B0604020202020204" pitchFamily="34" charset="0"/>
-              <a:buChar char="•"/>
-              <a:defRPr sz="2800" kern="1200">
-                <a:solidFill>
-                  <a:schemeClr val="tx1"/>
-                </a:solidFill>
-                <a:latin typeface="+mn-lt"/>
-                <a:ea typeface="+mn-ea"/>
-                <a:cs typeface="+mn-cs"/>
-              </a:defRPr>
-            </a:lvl1pPr>
-            <a:lvl2pPr marL="685800" indent="-228600" algn="l" defTabSz="914400" rtl="0" eaLnBrk="1" latinLnBrk="0" hangingPunct="1">
-              <a:lnSpc>
-                <a:spcPct val="90000"/>
-              </a:lnSpc>
-              <a:spcBef>
-                <a:spcPts val="500"/>
-              </a:spcBef>
-              <a:buFont typeface="Arial" panose="020B0604020202020204" pitchFamily="34" charset="0"/>
-              <a:buChar char="•"/>
-              <a:defRPr sz="2400" kern="1200">
-                <a:solidFill>
-                  <a:schemeClr val="tx1"/>
-                </a:solidFill>
-                <a:latin typeface="+mn-lt"/>
-                <a:ea typeface="+mn-ea"/>
-                <a:cs typeface="+mn-cs"/>
-              </a:defRPr>
-            </a:lvl2pPr>
-            <a:lvl3pPr marL="1143000" indent="-228600" algn="l" defTabSz="914400" rtl="0" eaLnBrk="1" latinLnBrk="0" hangingPunct="1">
-              <a:lnSpc>
-                <a:spcPct val="90000"/>
-              </a:lnSpc>
-              <a:spcBef>
-                <a:spcPts val="500"/>
-              </a:spcBef>
-              <a:buFont typeface="Arial" panose="020B0604020202020204" pitchFamily="34" charset="0"/>
-              <a:buChar char="•"/>
-              <a:defRPr sz="2000" kern="1200">
-                <a:solidFill>
-                  <a:schemeClr val="tx1"/>
-                </a:solidFill>
-                <a:latin typeface="+mn-lt"/>
-                <a:ea typeface="+mn-ea"/>
-                <a:cs typeface="+mn-cs"/>
-              </a:defRPr>
-            </a:lvl3pPr>
-            <a:lvl4pPr marL="1600200" indent="-228600" algn="l" defTabSz="914400" rtl="0" eaLnBrk="1" latinLnBrk="0" hangingPunct="1">
-              <a:lnSpc>
-                <a:spcPct val="90000"/>
-              </a:lnSpc>
-              <a:spcBef>
-                <a:spcPts val="500"/>
-              </a:spcBef>
-              <a:buFont typeface="Arial" panose="020B0604020202020204" pitchFamily="34" charset="0"/>
-              <a:buChar char="•"/>
-              <a:defRPr sz="1800" kern="1200">
-                <a:solidFill>
-                  <a:schemeClr val="tx1"/>
-                </a:solidFill>
-                <a:latin typeface="+mn-lt"/>
-                <a:ea typeface="+mn-ea"/>
-                <a:cs typeface="+mn-cs"/>
-              </a:defRPr>
-            </a:lvl4pPr>
-            <a:lvl5pPr marL="2057400" indent="-228600" algn="l" defTabSz="914400" rtl="0" eaLnBrk="1" latinLnBrk="0" hangingPunct="1">
-              <a:lnSpc>
-                <a:spcPct val="90000"/>
-              </a:lnSpc>
-              <a:spcBef>
-                <a:spcPts val="500"/>
-              </a:spcBef>
-              <a:buFont typeface="Arial" panose="020B0604020202020204" pitchFamily="34" charset="0"/>
-              <a:buChar char="•"/>
-              <a:defRPr sz="1800" kern="1200">
-                <a:solidFill>
-                  <a:schemeClr val="tx1"/>
-                </a:solidFill>
-                <a:latin typeface="+mn-lt"/>
-                <a:ea typeface="+mn-ea"/>
-                <a:cs typeface="+mn-cs"/>
-              </a:defRPr>
-            </a:lvl5pPr>
-            <a:lvl6pPr marL="2514600" indent="-228600" algn="l" defTabSz="914400" rtl="0" eaLnBrk="1" latinLnBrk="0" hangingPunct="1">
-              <a:lnSpc>
-                <a:spcPct val="90000"/>
-              </a:lnSpc>
-              <a:spcBef>
-                <a:spcPts val="500"/>
-              </a:spcBef>
-              <a:buFont typeface="Arial" panose="020B0604020202020204" pitchFamily="34" charset="0"/>
-              <a:buChar char="•"/>
-              <a:defRPr sz="1800" kern="1200">
-                <a:solidFill>
-                  <a:schemeClr val="tx1"/>
-                </a:solidFill>
-                <a:latin typeface="+mn-lt"/>
-                <a:ea typeface="+mn-ea"/>
-                <a:cs typeface="+mn-cs"/>
-              </a:defRPr>
-            </a:lvl6pPr>
-            <a:lvl7pPr marL="2971800" indent="-228600" algn="l" defTabSz="914400" rtl="0" eaLnBrk="1" latinLnBrk="0" hangingPunct="1">
-              <a:lnSpc>
-                <a:spcPct val="90000"/>
-              </a:lnSpc>
-              <a:spcBef>
-                <a:spcPts val="500"/>
-              </a:spcBef>
-              <a:buFont typeface="Arial" panose="020B0604020202020204" pitchFamily="34" charset="0"/>
-              <a:buChar char="•"/>
-              <a:defRPr sz="1800" kern="1200">
-                <a:solidFill>
-                  <a:schemeClr val="tx1"/>
-                </a:solidFill>
-                <a:latin typeface="+mn-lt"/>
-                <a:ea typeface="+mn-ea"/>
-                <a:cs typeface="+mn-cs"/>
-              </a:defRPr>
-            </a:lvl7pPr>
-            <a:lvl8pPr marL="3429000" indent="-228600" algn="l" defTabSz="914400" rtl="0" eaLnBrk="1" latinLnBrk="0" hangingPunct="1">
-              <a:lnSpc>
-                <a:spcPct val="90000"/>
-              </a:lnSpc>
-              <a:spcBef>
-                <a:spcPts val="500"/>
-              </a:spcBef>
-              <a:buFont typeface="Arial" panose="020B0604020202020204" pitchFamily="34" charset="0"/>
-              <a:buChar char="•"/>
-              <a:defRPr sz="1800" kern="1200">
-                <a:solidFill>
-                  <a:schemeClr val="tx1"/>
-                </a:solidFill>
-                <a:latin typeface="+mn-lt"/>
-                <a:ea typeface="+mn-ea"/>
-                <a:cs typeface="+mn-cs"/>
-              </a:defRPr>
-            </a:lvl8pPr>
-            <a:lvl9pPr marL="3886200" indent="-228600" algn="l" defTabSz="914400" rtl="0" eaLnBrk="1" latinLnBrk="0" hangingPunct="1">
-              <a:lnSpc>
-                <a:spcPct val="90000"/>
-              </a:lnSpc>
-              <a:spcBef>
-                <a:spcPts val="500"/>
-              </a:spcBef>
-              <a:buFont typeface="Arial" panose="020B0604020202020204" pitchFamily="34" charset="0"/>
-              <a:buChar char="•"/>
-              <a:defRPr sz="1800" kern="1200">
-                <a:solidFill>
-                  <a:schemeClr val="tx1"/>
-                </a:solidFill>
-                <a:latin typeface="+mn-lt"/>
-                <a:ea typeface="+mn-ea"/>
-                <a:cs typeface="+mn-cs"/>
-              </a:defRPr>
-            </a:lvl9pPr>
-          </a:lstStyle>
-          <a:p>
-            <a:pPr marL="722376" indent="-347472"/>
-            <a:r>
-              <a:rPr lang="pt-BR" dirty="0" smtClean="0">
-                <a:latin typeface="Segoe UI Light" panose="020B0502040204020203" pitchFamily="34" charset="0"/>
-                <a:cs typeface="Segoe UI Light" panose="020B0502040204020203" pitchFamily="34" charset="0"/>
-              </a:rPr>
-              <a:t>Go foi criada em 2007 para atender as necessidades da Google:</a:t>
-            </a:r>
-          </a:p>
-          <a:p>
-            <a:pPr marL="1179576" lvl="1" indent="-347472">
-              <a:spcBef>
-                <a:spcPts val="1200"/>
-              </a:spcBef>
-            </a:pPr>
-            <a:r>
-              <a:rPr lang="pt-BR" dirty="0" smtClean="0">
-                <a:latin typeface="Segoe UI Light" panose="020B0502040204020203" pitchFamily="34" charset="0"/>
-                <a:cs typeface="Segoe UI Light" panose="020B0502040204020203" pitchFamily="34" charset="0"/>
-              </a:rPr>
-              <a:t>Programação eficiente em larga escala</a:t>
-            </a:r>
-          </a:p>
-          <a:p>
-            <a:pPr marL="1179576" lvl="1" indent="-347472">
-              <a:spcBef>
-                <a:spcPts val="1200"/>
-              </a:spcBef>
-            </a:pPr>
-            <a:r>
-              <a:rPr lang="pt-BR" dirty="0" smtClean="0">
-                <a:latin typeface="Segoe UI Light" panose="020B0502040204020203" pitchFamily="34" charset="0"/>
-                <a:cs typeface="Segoe UI Light" panose="020B0502040204020203" pitchFamily="34" charset="0"/>
-              </a:rPr>
-              <a:t>Velocidade de compilação</a:t>
-            </a:r>
-          </a:p>
-          <a:p>
-            <a:pPr marL="1179576" lvl="1" indent="-347472">
-              <a:spcBef>
-                <a:spcPts val="1200"/>
-              </a:spcBef>
-            </a:pPr>
-            <a:r>
-              <a:rPr lang="pt-BR" dirty="0" smtClean="0">
-                <a:latin typeface="Segoe UI Light" panose="020B0502040204020203" pitchFamily="34" charset="0"/>
-                <a:cs typeface="Segoe UI Light" panose="020B0502040204020203" pitchFamily="34" charset="0"/>
-              </a:rPr>
-              <a:t>Sistemas distribuídos</a:t>
-            </a:r>
-          </a:p>
-          <a:p>
-            <a:pPr marL="722376" indent="-347472"/>
-            <a:r>
-              <a:rPr lang="pt-BR" dirty="0" smtClean="0">
-                <a:latin typeface="Segoe UI Light" panose="020B0502040204020203" pitchFamily="34" charset="0"/>
-                <a:cs typeface="Segoe UI Light" panose="020B0502040204020203" pitchFamily="34" charset="0"/>
-              </a:rPr>
-              <a:t>Por que uma nova linguagem?</a:t>
-            </a:r>
-          </a:p>
-          <a:p>
-            <a:pPr marL="1179576" lvl="1" indent="-347472"/>
-            <a:r>
-              <a:rPr lang="pt-BR" dirty="0" smtClean="0">
-                <a:latin typeface="Segoe UI Light" panose="020B0502040204020203" pitchFamily="34" charset="0"/>
-                <a:cs typeface="Segoe UI Light" panose="020B0502040204020203" pitchFamily="34" charset="0"/>
-              </a:rPr>
-              <a:t>Combinar facilidade de uma linguagem interpretada e dinamicamente tipada com a eficiência e segurança de uma linguagem compilada e estaticamente tipada.</a:t>
-            </a:r>
-            <a:endParaRPr lang="pt-BR" dirty="0" smtClean="0">
-              <a:latin typeface="Segoe UI Light" panose="020B0502040204020203" pitchFamily="34" charset="0"/>
-              <a:cs typeface="Segoe UI Light" panose="020B0502040204020203" pitchFamily="34" charset="0"/>
-            </a:endParaRPr>
-          </a:p>
-        </p:txBody>
-      </p:sp>
-      <p:sp>
-        <p:nvSpPr>
-          <p:cNvPr id="5" name="Shape 494"/>
-          <p:cNvSpPr txBox="1">
-            <a:spLocks/>
-          </p:cNvSpPr>
-          <p:nvPr/>
-        </p:nvSpPr>
-        <p:spPr>
-          <a:xfrm>
-            <a:off x="0" y="0"/>
-            <a:ext cx="12191999" cy="979136"/>
-          </a:xfrm>
-          <a:prstGeom prst="rect">
-            <a:avLst/>
-          </a:prstGeom>
-          <a:solidFill>
-            <a:srgbClr val="0072C6"/>
-          </a:solidFill>
-          <a:ln>
-            <a:noFill/>
-          </a:ln>
-        </p:spPr>
-        <p:txBody>
-          <a:bodyPr lIns="0" tIns="0" rIns="0" bIns="0" anchor="ctr" anchorCtr="0">
-            <a:noAutofit/>
-          </a:bodyPr>
-          <a:lstStyle>
-            <a:defPPr marR="0" algn="l" rtl="0">
-              <a:lnSpc>
-                <a:spcPct val="100000"/>
-              </a:lnSpc>
-              <a:spcBef>
-                <a:spcPts val="0"/>
-              </a:spcBef>
-              <a:spcAft>
-                <a:spcPts val="0"/>
-              </a:spcAft>
-            </a:defPPr>
-            <a:lvl1pPr marL="0" marR="0" indent="0" algn="l" rtl="0">
-              <a:lnSpc>
-                <a:spcPct val="90000"/>
-              </a:lnSpc>
-              <a:spcBef>
-                <a:spcPts val="0"/>
-              </a:spcBef>
-              <a:spcAft>
-                <a:spcPts val="0"/>
-              </a:spcAft>
-              <a:buClr>
-                <a:schemeClr val="dk1"/>
-              </a:buClr>
-              <a:buFont typeface="Quattrocento Sans"/>
-              <a:buNone/>
-              <a:defRPr sz="1400" b="0" i="0" u="none" strike="noStrike" cap="none" baseline="0">
-                <a:solidFill>
-                  <a:srgbClr val="000000"/>
-                </a:solidFill>
-                <a:latin typeface="Arial"/>
-                <a:ea typeface="Arial"/>
-                <a:cs typeface="Arial"/>
-                <a:sym typeface="Arial"/>
-                <a:rtl val="0"/>
-              </a:defRPr>
-            </a:lvl1pPr>
-            <a:lvl2pPr marL="0" marR="0" indent="0" algn="l" rtl="0">
-              <a:lnSpc>
-                <a:spcPct val="100000"/>
-              </a:lnSpc>
-              <a:spcBef>
-                <a:spcPts val="0"/>
-              </a:spcBef>
-              <a:spcAft>
-                <a:spcPts val="0"/>
-              </a:spcAft>
-              <a:buNone/>
-              <a:defRPr sz="1400" b="0" i="0" u="none" strike="noStrike" cap="none" baseline="0">
-                <a:solidFill>
-                  <a:srgbClr val="000000"/>
-                </a:solidFill>
-                <a:latin typeface="Arial"/>
-                <a:ea typeface="Arial"/>
-                <a:cs typeface="Arial"/>
-                <a:sym typeface="Arial"/>
-                <a:rtl val="0"/>
-              </a:defRPr>
-            </a:lvl2pPr>
-            <a:lvl3pPr marL="0" marR="0" indent="0" algn="l" rtl="0">
-              <a:spcBef>
-                <a:spcPts val="0"/>
-              </a:spcBef>
-              <a:defRPr/>
-            </a:lvl3pPr>
-            <a:lvl4pPr marL="0" marR="0" indent="0" algn="l" rtl="0">
-              <a:spcBef>
-                <a:spcPts val="0"/>
-              </a:spcBef>
-              <a:defRPr/>
-            </a:lvl4pPr>
-            <a:lvl5pPr marL="0" marR="0" indent="0" algn="l" rtl="0">
-              <a:spcBef>
-                <a:spcPts val="0"/>
-              </a:spcBef>
-              <a:defRPr/>
-            </a:lvl5pPr>
-            <a:lvl6pPr marL="0" marR="0" indent="0" algn="l" rtl="0">
-              <a:spcBef>
-                <a:spcPts val="0"/>
-              </a:spcBef>
-              <a:defRPr/>
-            </a:lvl6pPr>
-            <a:lvl7pPr marL="0" marR="0" indent="0" algn="l" rtl="0">
-              <a:spcBef>
-                <a:spcPts val="0"/>
-              </a:spcBef>
-              <a:defRPr/>
-            </a:lvl7pPr>
-            <a:lvl8pPr marL="0" marR="0" indent="0" algn="l" rtl="0">
-              <a:spcBef>
-                <a:spcPts val="0"/>
-              </a:spcBef>
-              <a:defRPr/>
-            </a:lvl8pPr>
-            <a:lvl9pPr marL="0" marR="0" indent="0" algn="l" rtl="0">
-              <a:spcBef>
-                <a:spcPts val="0"/>
-              </a:spcBef>
-              <a:defRPr/>
-            </a:lvl9pPr>
-          </a:lstStyle>
-          <a:p>
-            <a:pPr marL="360000">
-              <a:buClr>
-                <a:schemeClr val="dk2"/>
-              </a:buClr>
-              <a:buSzPct val="25000"/>
-            </a:pPr>
-            <a:r>
-              <a:rPr lang="en-US" sz="3600" dirty="0" err="1" smtClean="0">
-                <a:solidFill>
-                  <a:schemeClr val="bg1"/>
-                </a:solidFill>
-                <a:latin typeface="Segoe UI Light" panose="020B0502040204020203" pitchFamily="34" charset="0"/>
-                <a:ea typeface="Quattrocento Sans"/>
-                <a:cs typeface="Segoe UI Light" panose="020B0502040204020203" pitchFamily="34" charset="0"/>
-                <a:sym typeface="Quattrocento Sans"/>
-              </a:rPr>
-              <a:t>Orientação</a:t>
-            </a:r>
-            <a:r>
-              <a:rPr lang="en-US" sz="3600" dirty="0" smtClean="0">
-                <a:solidFill>
-                  <a:schemeClr val="bg1"/>
-                </a:solidFill>
-                <a:latin typeface="Segoe UI Light" panose="020B0502040204020203" pitchFamily="34" charset="0"/>
-                <a:ea typeface="Quattrocento Sans"/>
-                <a:cs typeface="Segoe UI Light" panose="020B0502040204020203" pitchFamily="34" charset="0"/>
-                <a:sym typeface="Quattrocento Sans"/>
-              </a:rPr>
-              <a:t> a </a:t>
-            </a:r>
-            <a:r>
-              <a:rPr lang="en-US" sz="3600" dirty="0" err="1" smtClean="0">
-                <a:solidFill>
-                  <a:schemeClr val="bg1"/>
-                </a:solidFill>
-                <a:latin typeface="Segoe UI Light" panose="020B0502040204020203" pitchFamily="34" charset="0"/>
-                <a:ea typeface="Quattrocento Sans"/>
-                <a:cs typeface="Segoe UI Light" panose="020B0502040204020203" pitchFamily="34" charset="0"/>
-                <a:sym typeface="Quattrocento Sans"/>
-              </a:rPr>
-              <a:t>objetos</a:t>
-            </a:r>
-            <a:r>
-              <a:rPr lang="en-US" sz="3600" dirty="0" smtClean="0">
-                <a:solidFill>
-                  <a:schemeClr val="bg1"/>
-                </a:solidFill>
-                <a:latin typeface="Segoe UI Light" panose="020B0502040204020203" pitchFamily="34" charset="0"/>
-                <a:ea typeface="Quattrocento Sans"/>
-                <a:cs typeface="Segoe UI Light" panose="020B0502040204020203" pitchFamily="34" charset="0"/>
-                <a:sym typeface="Quattrocento Sans"/>
-              </a:rPr>
-              <a:t> – </a:t>
-            </a:r>
-            <a:r>
-              <a:rPr lang="en-US" sz="3600" dirty="0" err="1" smtClean="0">
-                <a:solidFill>
-                  <a:schemeClr val="bg1"/>
-                </a:solidFill>
-                <a:latin typeface="Segoe UI Light" panose="020B0502040204020203" pitchFamily="34" charset="0"/>
-                <a:ea typeface="Quattrocento Sans"/>
-                <a:cs typeface="Segoe UI Light" panose="020B0502040204020203" pitchFamily="34" charset="0"/>
-                <a:sym typeface="Quattrocento Sans"/>
-              </a:rPr>
-              <a:t>Classe</a:t>
-            </a:r>
-            <a:r>
-              <a:rPr lang="en-US" sz="3600" dirty="0" smtClean="0">
-                <a:solidFill>
-                  <a:schemeClr val="bg1"/>
-                </a:solidFill>
-                <a:latin typeface="Segoe UI Light" panose="020B0502040204020203" pitchFamily="34" charset="0"/>
-                <a:ea typeface="Quattrocento Sans"/>
-                <a:cs typeface="Segoe UI Light" panose="020B0502040204020203" pitchFamily="34" charset="0"/>
-                <a:sym typeface="Quattrocento Sans"/>
-              </a:rPr>
-              <a:t> </a:t>
-            </a:r>
-            <a:endParaRPr lang="en-US" sz="3600" dirty="0">
-              <a:solidFill>
-                <a:schemeClr val="bg1"/>
-              </a:solidFill>
-              <a:latin typeface="Segoe UI Light" panose="020B0502040204020203" pitchFamily="34" charset="0"/>
-              <a:ea typeface="Quattrocento Sans"/>
-              <a:cs typeface="Segoe UI Light" panose="020B0502040204020203" pitchFamily="34" charset="0"/>
-              <a:sym typeface="Quattrocento Sans"/>
-            </a:endParaRPr>
-          </a:p>
-        </p:txBody>
-      </p:sp>
-    </p:spTree>
-    <p:extLst>
-      <p:ext uri="{BB962C8B-B14F-4D97-AF65-F5344CB8AC3E}">
-        <p14:creationId xmlns:p14="http://schemas.microsoft.com/office/powerpoint/2010/main" val="793392352"/>
-      </p:ext>
-    </p:extLst>
-  </p:cSld>
-  <p:clrMapOvr>
-    <a:masterClrMapping/>
-  </p:clrMapOvr>
-  <p:timing>
-    <p:tnLst>
-      <p:par>
-        <p:cTn id="1" dur="indefinite" restart="never" nodeType="tmRoot">
-          <p:childTnLst>
-            <p:seq concurrent="1" nextAc="seek">
-              <p:cTn id="2" dur="indefinite" nodeType="mainSeq">
-                <p:childTnLst>
-                  <p:par>
-                    <p:cTn id="3" fill="hold">
-                      <p:stCondLst>
-                        <p:cond delay="indefinite"/>
-                      </p:stCondLst>
-                      <p:childTnLst>
-                        <p:par>
-                          <p:cTn id="4" fill="hold">
-                            <p:stCondLst>
-                              <p:cond delay="0"/>
-                            </p:stCondLst>
-                            <p:childTnLst>
-                              <p:par>
-                                <p:cTn id="5" presetID="10" presetClass="entr" presetSubtype="0" fill="hold" nodeType="clickEffect">
-                                  <p:stCondLst>
-                                    <p:cond delay="0"/>
-                                  </p:stCondLst>
-                                  <p:childTnLst>
-                                    <p:set>
-                                      <p:cBhvr>
-                                        <p:cTn id="6" dur="1" fill="hold">
-                                          <p:stCondLst>
-                                            <p:cond delay="0"/>
-                                          </p:stCondLst>
-                                        </p:cTn>
-                                        <p:tgtEl>
-                                          <p:spTgt spid="4">
-                                            <p:txEl>
-                                              <p:pRg st="4" end="4"/>
-                                            </p:txEl>
-                                          </p:spTgt>
-                                        </p:tgtEl>
-                                        <p:attrNameLst>
-                                          <p:attrName>style.visibility</p:attrName>
-                                        </p:attrNameLst>
-                                      </p:cBhvr>
-                                      <p:to>
-                                        <p:strVal val="visible"/>
-                                      </p:to>
-                                    </p:set>
-                                    <p:animEffect transition="in" filter="fade">
-                                      <p:cBhvr>
-                                        <p:cTn id="7" dur="500"/>
-                                        <p:tgtEl>
-                                          <p:spTgt spid="4">
-                                            <p:txEl>
-                                              <p:pRg st="4" end="4"/>
-                                            </p:txEl>
-                                          </p:spTgt>
-                                        </p:tgtEl>
-                                      </p:cBhvr>
-                                    </p:animEffect>
-                                  </p:childTnLst>
-                                </p:cTn>
-                              </p:par>
-                              <p:par>
-                                <p:cTn id="8" presetID="10" presetClass="entr" presetSubtype="0" fill="hold" nodeType="withEffect">
-                                  <p:stCondLst>
-                                    <p:cond delay="0"/>
-                                  </p:stCondLst>
-                                  <p:childTnLst>
-                                    <p:set>
-                                      <p:cBhvr>
-                                        <p:cTn id="9" dur="1" fill="hold">
-                                          <p:stCondLst>
-                                            <p:cond delay="0"/>
-                                          </p:stCondLst>
-                                        </p:cTn>
-                                        <p:tgtEl>
-                                          <p:spTgt spid="4">
-                                            <p:txEl>
-                                              <p:pRg st="5" end="5"/>
-                                            </p:txEl>
-                                          </p:spTgt>
-                                        </p:tgtEl>
-                                        <p:attrNameLst>
-                                          <p:attrName>style.visibility</p:attrName>
-                                        </p:attrNameLst>
-                                      </p:cBhvr>
-                                      <p:to>
-                                        <p:strVal val="visible"/>
-                                      </p:to>
-                                    </p:set>
-                                    <p:animEffect transition="in" filter="fade">
-                                      <p:cBhvr>
-                                        <p:cTn id="10" dur="500"/>
-                                        <p:tgtEl>
-                                          <p:spTgt spid="4">
-                                            <p:txEl>
-                                              <p:pRg st="5" end="5"/>
-                                            </p:txEl>
-                                          </p:spTgt>
-                                        </p:tgtEl>
-                                      </p:cBhvr>
-                                    </p:animEffect>
-                                  </p:childTnLst>
-                                </p:cTn>
-                              </p:par>
-                            </p:childTnLst>
-                          </p:cTn>
-                        </p:par>
-                      </p:childTnLst>
-                    </p:cTn>
-                  </p:par>
-                </p:childTnLst>
-              </p:cTn>
-              <p:prevCondLst>
-                <p:cond evt="onPrev" delay="0">
-                  <p:tgtEl>
-                    <p:sldTgt/>
-                  </p:tgtEl>
-                </p:cond>
-              </p:prevCondLst>
-              <p:nextCondLst>
-                <p:cond evt="onNext" delay="0">
-                  <p:tgtEl>
-                    <p:sldTgt/>
-                  </p:tgtEl>
-                </p:cond>
-              </p:nextCondLst>
-            </p:seq>
-          </p:childTnLst>
-        </p:cTn>
-      </p:par>
-    </p:tnLst>
-  </p:timing>
-</p:sld>
-</file>
-
-<file path=ppt/slides/slide6.xml><?xml version="1.0" encoding="utf-8"?>
-<p:sld xmlns:a="http://schemas.openxmlformats.org/drawingml/2006/main" xmlns:r="http://schemas.openxmlformats.org/officeDocument/2006/relationships" xmlns:p="http://schemas.openxmlformats.org/presentationml/2006/main">
-  <p:cSld>
-    <p:spTree>
-      <p:nvGrpSpPr>
         <p:cNvPr id="1" name="Shape 294"/>
         <p:cNvGrpSpPr/>
         <p:nvPr/>
@@ -10691,6 +10702,30 @@
                 <a:cs typeface="Segoe UI Light" panose="020B0502040204020203" pitchFamily="34" charset="0"/>
                 <a:sym typeface="Quattrocento Sans"/>
               </a:rPr>
+              <a:t> e </a:t>
+            </a:r>
+            <a:r>
+              <a:rPr lang="en-US" sz="3600" dirty="0" err="1" smtClean="0">
+                <a:solidFill>
+                  <a:schemeClr val="bg1"/>
+                </a:solidFill>
+                <a:latin typeface="Segoe UI Light" panose="020B0502040204020203" pitchFamily="34" charset="0"/>
+                <a:ea typeface="Quattrocento Sans"/>
+                <a:cs typeface="Segoe UI Light" panose="020B0502040204020203" pitchFamily="34" charset="0"/>
+                <a:sym typeface="Quattrocento Sans"/>
+              </a:rPr>
+              <a:t>método</a:t>
+            </a:r>
+            <a:r>
+              <a:rPr lang="en-US" sz="3600" dirty="0" smtClean="0">
+                <a:solidFill>
+                  <a:schemeClr val="bg1"/>
+                </a:solidFill>
+                <a:latin typeface="Segoe UI Light" panose="020B0502040204020203" pitchFamily="34" charset="0"/>
+                <a:ea typeface="Quattrocento Sans"/>
+                <a:cs typeface="Segoe UI Light" panose="020B0502040204020203" pitchFamily="34" charset="0"/>
+                <a:sym typeface="Quattrocento Sans"/>
+              </a:rPr>
               <a:t> </a:t>
             </a:r>
             <a:endParaRPr lang="en-US" sz="3600" dirty="0">
@@ -11799,7 +11834,7 @@
 </p:sld>
 </file>
 
-<file path=ppt/slides/slide7.xml><?xml version="1.0" encoding="utf-8"?>
+<file path=ppt/slides/slide6.xml><?xml version="1.0" encoding="utf-8"?>
 <p:sld xmlns:a="http://schemas.openxmlformats.org/drawingml/2006/main" xmlns:r="http://schemas.openxmlformats.org/officeDocument/2006/relationships" xmlns:p="http://schemas.openxmlformats.org/presentationml/2006/main">
   <p:cSld>
     <p:spTree>
@@ -11915,7 +11950,7 @@
 </p:sld>
 </file>
 
-<file path=ppt/slides/slide8.xml><?xml version="1.0" encoding="utf-8"?>
+<file path=ppt/slides/slide7.xml><?xml version="1.0" encoding="utf-8"?>
 <p:sld xmlns:a="http://schemas.openxmlformats.org/drawingml/2006/main" xmlns:r="http://schemas.openxmlformats.org/officeDocument/2006/relationships" xmlns:p="http://schemas.openxmlformats.org/presentationml/2006/main">
   <p:cSld>
     <p:spTree>
@@ -12476,7 +12511,7 @@
 </p:sld>
 </file>
 
-<file path=ppt/slides/slide9.xml><?xml version="1.0" encoding="utf-8"?>
+<file path=ppt/slides/slide8.xml><?xml version="1.0" encoding="utf-8"?>
 <p:sld xmlns:a="http://schemas.openxmlformats.org/drawingml/2006/main" xmlns:r="http://schemas.openxmlformats.org/officeDocument/2006/relationships" xmlns:p="http://schemas.openxmlformats.org/presentationml/2006/main">
   <p:cSld>
     <p:spTree>
@@ -12575,6 +12610,1023 @@
     <p:extLst>
       <p:ext uri="{BB962C8B-B14F-4D97-AF65-F5344CB8AC3E}">
         <p14:creationId xmlns:p14="http://schemas.microsoft.com/office/powerpoint/2010/main" val="3263116791"/>
+      </p:ext>
+    </p:extLst>
+  </p:cSld>
+  <p:clrMapOvr>
+    <a:masterClrMapping/>
+  </p:clrMapOvr>
+  <p:transition>
+    <p:fade/>
+  </p:transition>
+  <p:timing>
+    <p:tnLst>
+      <p:par>
+        <p:cTn id="1" dur="indefinite" restart="never" nodeType="tmRoot"/>
+      </p:par>
+    </p:tnLst>
+  </p:timing>
+</p:sld>
+</file>
+
+<file path=ppt/slides/slide9.xml><?xml version="1.0" encoding="utf-8"?>
+<p:sld xmlns:a="http://schemas.openxmlformats.org/drawingml/2006/main" xmlns:r="http://schemas.openxmlformats.org/officeDocument/2006/relationships" xmlns:p="http://schemas.openxmlformats.org/presentationml/2006/main">
+  <p:cSld>
+    <p:spTree>
+      <p:nvGrpSpPr>
+        <p:cNvPr id="1" name="Shape 232"/>
+        <p:cNvGrpSpPr/>
+        <p:nvPr/>
+      </p:nvGrpSpPr>
+      <p:grpSpPr>
+        <a:xfrm>
+          <a:off x="0" y="0"/>
+          <a:ext cx="0" cy="0"/>
+          <a:chOff x="0" y="0"/>
+          <a:chExt cx="0" cy="0"/>
+        </a:xfrm>
+      </p:grpSpPr>
+      <p:sp>
+        <p:nvSpPr>
+          <p:cNvPr id="8" name="Shape 494"/>
+          <p:cNvSpPr txBox="1">
+            <a:spLocks/>
+          </p:cNvSpPr>
+          <p:nvPr/>
+        </p:nvSpPr>
+        <p:spPr>
+          <a:xfrm>
+            <a:off x="0" y="0"/>
+            <a:ext cx="12191999" cy="979136"/>
+          </a:xfrm>
+          <a:prstGeom prst="rect">
+            <a:avLst/>
+          </a:prstGeom>
+          <a:solidFill>
+            <a:srgbClr val="008272"/>
+          </a:solidFill>
+          <a:ln>
+            <a:noFill/>
+          </a:ln>
+        </p:spPr>
+        <p:txBody>
+          <a:bodyPr lIns="0" tIns="0" rIns="0" bIns="0" anchor="ctr" anchorCtr="0">
+            <a:noAutofit/>
+          </a:bodyPr>
+          <a:lstStyle>
+            <a:defPPr marR="0" algn="l" rtl="0">
+              <a:lnSpc>
+                <a:spcPct val="100000"/>
+              </a:lnSpc>
+              <a:spcBef>
+                <a:spcPts val="0"/>
+              </a:spcBef>
+              <a:spcAft>
+                <a:spcPts val="0"/>
+              </a:spcAft>
+            </a:defPPr>
+            <a:lvl1pPr marL="0" marR="0" indent="0" algn="l" rtl="0">
+              <a:lnSpc>
+                <a:spcPct val="90000"/>
+              </a:lnSpc>
+              <a:spcBef>
+                <a:spcPts val="0"/>
+              </a:spcBef>
+              <a:spcAft>
+                <a:spcPts val="0"/>
+              </a:spcAft>
+              <a:buClr>
+                <a:schemeClr val="dk1"/>
+              </a:buClr>
+              <a:buFont typeface="Quattrocento Sans"/>
+              <a:buNone/>
+              <a:defRPr sz="1400" b="0" i="0" u="none" strike="noStrike" cap="none" baseline="0">
+                <a:solidFill>
+                  <a:srgbClr val="000000"/>
+                </a:solidFill>
+                <a:latin typeface="Arial"/>
+                <a:ea typeface="Arial"/>
+                <a:cs typeface="Arial"/>
+                <a:sym typeface="Arial"/>
+                <a:rtl val="0"/>
+              </a:defRPr>
+            </a:lvl1pPr>
+            <a:lvl2pPr marL="0" marR="0" indent="0" algn="l" rtl="0">
+              <a:lnSpc>
+                <a:spcPct val="100000"/>
+              </a:lnSpc>
+              <a:spcBef>
+                <a:spcPts val="0"/>
+              </a:spcBef>
+              <a:spcAft>
+                <a:spcPts val="0"/>
+              </a:spcAft>
+              <a:buNone/>
+              <a:defRPr sz="1400" b="0" i="0" u="none" strike="noStrike" cap="none" baseline="0">
+                <a:solidFill>
+                  <a:srgbClr val="000000"/>
+                </a:solidFill>
+                <a:latin typeface="Arial"/>
+                <a:ea typeface="Arial"/>
+                <a:cs typeface="Arial"/>
+                <a:sym typeface="Arial"/>
+                <a:rtl val="0"/>
+              </a:defRPr>
+            </a:lvl2pPr>
+            <a:lvl3pPr marL="0" marR="0" indent="0" algn="l" rtl="0">
+              <a:spcBef>
+                <a:spcPts val="0"/>
+              </a:spcBef>
+              <a:defRPr/>
+            </a:lvl3pPr>
+            <a:lvl4pPr marL="0" marR="0" indent="0" algn="l" rtl="0">
+              <a:spcBef>
+                <a:spcPts val="0"/>
+              </a:spcBef>
+              <a:defRPr/>
+            </a:lvl4pPr>
+            <a:lvl5pPr marL="0" marR="0" indent="0" algn="l" rtl="0">
+              <a:spcBef>
+                <a:spcPts val="0"/>
+              </a:spcBef>
+              <a:defRPr/>
+            </a:lvl5pPr>
+            <a:lvl6pPr marL="0" marR="0" indent="0" algn="l" rtl="0">
+              <a:spcBef>
+                <a:spcPts val="0"/>
+              </a:spcBef>
+              <a:defRPr/>
+            </a:lvl6pPr>
+            <a:lvl7pPr marL="0" marR="0" indent="0" algn="l" rtl="0">
+              <a:spcBef>
+                <a:spcPts val="0"/>
+              </a:spcBef>
+              <a:defRPr/>
+            </a:lvl7pPr>
+            <a:lvl8pPr marL="0" marR="0" indent="0" algn="l" rtl="0">
+              <a:spcBef>
+                <a:spcPts val="0"/>
+              </a:spcBef>
+              <a:defRPr/>
+            </a:lvl8pPr>
+            <a:lvl9pPr marL="0" marR="0" indent="0" algn="l" rtl="0">
+              <a:spcBef>
+                <a:spcPts val="0"/>
+              </a:spcBef>
+              <a:defRPr/>
+            </a:lvl9pPr>
+          </a:lstStyle>
+          <a:p>
+            <a:pPr marL="360000">
+              <a:buClr>
+                <a:srgbClr val="68217A"/>
+              </a:buClr>
+              <a:buSzPct val="25000"/>
+            </a:pPr>
+            <a:r>
+              <a:rPr lang="en-US" sz="3600" dirty="0" err="1" smtClean="0">
+                <a:solidFill>
+                  <a:schemeClr val="bg1"/>
+                </a:solidFill>
+                <a:latin typeface="Segoe UI Light" panose="020B0502040204020203" pitchFamily="34" charset="0"/>
+                <a:ea typeface="Quattrocento Sans"/>
+                <a:cs typeface="Segoe UI Light" panose="020B0502040204020203" pitchFamily="34" charset="0"/>
+              </a:rPr>
+              <a:t>Lista</a:t>
+            </a:r>
+            <a:endParaRPr lang="en-US" sz="3600" kern="0" dirty="0">
+              <a:solidFill>
+                <a:schemeClr val="bg1"/>
+              </a:solidFill>
+              <a:latin typeface="Segoe UI Light" panose="020B0502040204020203" pitchFamily="34" charset="0"/>
+              <a:ea typeface="Quattrocento Sans"/>
+              <a:cs typeface="Segoe UI Light" panose="020B0502040204020203" pitchFamily="34" charset="0"/>
+              <a:sym typeface="Quattrocento Sans"/>
+            </a:endParaRPr>
+          </a:p>
+        </p:txBody>
+      </p:sp>
+      <p:sp>
+        <p:nvSpPr>
+          <p:cNvPr id="3" name="Rectangle 3"/>
+          <p:cNvSpPr txBox="1">
+            <a:spLocks noChangeArrowheads="1"/>
+          </p:cNvSpPr>
+          <p:nvPr/>
+        </p:nvSpPr>
+        <p:spPr>
+          <a:xfrm>
+            <a:off x="457200" y="1143000"/>
+            <a:ext cx="11455400" cy="5105400"/>
+          </a:xfrm>
+          <a:prstGeom prst="rect">
+            <a:avLst/>
+          </a:prstGeom>
+        </p:spPr>
+        <p:txBody>
+          <a:bodyPr/>
+          <a:lstStyle>
+            <a:defPPr marR="0" algn="l" rtl="0">
+              <a:lnSpc>
+                <a:spcPct val="100000"/>
+              </a:lnSpc>
+              <a:spcBef>
+                <a:spcPts val="0"/>
+              </a:spcBef>
+              <a:spcAft>
+                <a:spcPts val="0"/>
+              </a:spcAft>
+            </a:defPPr>
+            <a:lvl1pPr marR="0" algn="l" rtl="0">
+              <a:lnSpc>
+                <a:spcPct val="100000"/>
+              </a:lnSpc>
+              <a:spcBef>
+                <a:spcPts val="0"/>
+              </a:spcBef>
+              <a:spcAft>
+                <a:spcPts val="0"/>
+              </a:spcAft>
+              <a:buNone/>
+              <a:defRPr sz="1400" b="0" i="0" u="none" strike="noStrike" cap="none" baseline="0">
+                <a:solidFill>
+                  <a:srgbClr val="000000"/>
+                </a:solidFill>
+                <a:latin typeface="Arial"/>
+                <a:ea typeface="Arial"/>
+                <a:cs typeface="Arial"/>
+                <a:sym typeface="Arial"/>
+                <a:rtl val="0"/>
+              </a:defRPr>
+            </a:lvl1pPr>
+            <a:lvl2pPr marR="0" algn="l" rtl="0">
+              <a:lnSpc>
+                <a:spcPct val="100000"/>
+              </a:lnSpc>
+              <a:spcBef>
+                <a:spcPts val="0"/>
+              </a:spcBef>
+              <a:spcAft>
+                <a:spcPts val="0"/>
+              </a:spcAft>
+              <a:buNone/>
+              <a:defRPr sz="1400" b="0" i="0" u="none" strike="noStrike" cap="none" baseline="0">
+                <a:solidFill>
+                  <a:srgbClr val="000000"/>
+                </a:solidFill>
+                <a:latin typeface="Arial"/>
+                <a:ea typeface="Arial"/>
+                <a:cs typeface="Arial"/>
+                <a:sym typeface="Arial"/>
+                <a:rtl val="0"/>
+              </a:defRPr>
+            </a:lvl2pPr>
+            <a:lvl3pPr marR="0" algn="l" rtl="0">
+              <a:lnSpc>
+                <a:spcPct val="100000"/>
+              </a:lnSpc>
+              <a:spcBef>
+                <a:spcPts val="0"/>
+              </a:spcBef>
+              <a:spcAft>
+                <a:spcPts val="0"/>
+              </a:spcAft>
+              <a:buNone/>
+              <a:defRPr sz="1400" b="0" i="0" u="none" strike="noStrike" cap="none" baseline="0">
+                <a:solidFill>
+                  <a:srgbClr val="000000"/>
+                </a:solidFill>
+                <a:latin typeface="Arial"/>
+                <a:ea typeface="Arial"/>
+                <a:cs typeface="Arial"/>
+                <a:sym typeface="Arial"/>
+                <a:rtl val="0"/>
+              </a:defRPr>
+            </a:lvl3pPr>
+            <a:lvl4pPr marR="0" algn="l" rtl="0">
+              <a:lnSpc>
+                <a:spcPct val="100000"/>
+              </a:lnSpc>
+              <a:spcBef>
+                <a:spcPts val="0"/>
+              </a:spcBef>
+              <a:spcAft>
+                <a:spcPts val="0"/>
+              </a:spcAft>
+              <a:buNone/>
+              <a:defRPr sz="1400" b="0" i="0" u="none" strike="noStrike" cap="none" baseline="0">
+                <a:solidFill>
+                  <a:srgbClr val="000000"/>
+                </a:solidFill>
+                <a:latin typeface="Arial"/>
+                <a:ea typeface="Arial"/>
+                <a:cs typeface="Arial"/>
+                <a:sym typeface="Arial"/>
+                <a:rtl val="0"/>
+              </a:defRPr>
+            </a:lvl4pPr>
+            <a:lvl5pPr marR="0" algn="l" rtl="0">
+              <a:lnSpc>
+                <a:spcPct val="100000"/>
+              </a:lnSpc>
+              <a:spcBef>
+                <a:spcPts val="0"/>
+              </a:spcBef>
+              <a:spcAft>
+                <a:spcPts val="0"/>
+              </a:spcAft>
+              <a:buNone/>
+              <a:defRPr sz="1400" b="0" i="0" u="none" strike="noStrike" cap="none" baseline="0">
+                <a:solidFill>
+                  <a:srgbClr val="000000"/>
+                </a:solidFill>
+                <a:latin typeface="Arial"/>
+                <a:ea typeface="Arial"/>
+                <a:cs typeface="Arial"/>
+                <a:sym typeface="Arial"/>
+                <a:rtl val="0"/>
+              </a:defRPr>
+            </a:lvl5pPr>
+            <a:lvl6pPr marR="0" algn="l" rtl="0">
+              <a:lnSpc>
+                <a:spcPct val="100000"/>
+              </a:lnSpc>
+              <a:spcBef>
+                <a:spcPts val="0"/>
+              </a:spcBef>
+              <a:spcAft>
+                <a:spcPts val="0"/>
+              </a:spcAft>
+              <a:buNone/>
+              <a:defRPr sz="1400" b="0" i="0" u="none" strike="noStrike" cap="none" baseline="0">
+                <a:solidFill>
+                  <a:srgbClr val="000000"/>
+                </a:solidFill>
+                <a:latin typeface="Arial"/>
+                <a:ea typeface="Arial"/>
+                <a:cs typeface="Arial"/>
+                <a:sym typeface="Arial"/>
+                <a:rtl val="0"/>
+              </a:defRPr>
+            </a:lvl6pPr>
+            <a:lvl7pPr marR="0" algn="l" rtl="0">
+              <a:lnSpc>
+                <a:spcPct val="100000"/>
+              </a:lnSpc>
+              <a:spcBef>
+                <a:spcPts val="0"/>
+              </a:spcBef>
+              <a:spcAft>
+                <a:spcPts val="0"/>
+              </a:spcAft>
+              <a:buNone/>
+              <a:defRPr sz="1400" b="0" i="0" u="none" strike="noStrike" cap="none" baseline="0">
+                <a:solidFill>
+                  <a:srgbClr val="000000"/>
+                </a:solidFill>
+                <a:latin typeface="Arial"/>
+                <a:ea typeface="Arial"/>
+                <a:cs typeface="Arial"/>
+                <a:sym typeface="Arial"/>
+                <a:rtl val="0"/>
+              </a:defRPr>
+            </a:lvl7pPr>
+            <a:lvl8pPr marR="0" algn="l" rtl="0">
+              <a:lnSpc>
+                <a:spcPct val="100000"/>
+              </a:lnSpc>
+              <a:spcBef>
+                <a:spcPts val="0"/>
+              </a:spcBef>
+              <a:spcAft>
+                <a:spcPts val="0"/>
+              </a:spcAft>
+              <a:buNone/>
+              <a:defRPr sz="1400" b="0" i="0" u="none" strike="noStrike" cap="none" baseline="0">
+                <a:solidFill>
+                  <a:srgbClr val="000000"/>
+                </a:solidFill>
+                <a:latin typeface="Arial"/>
+                <a:ea typeface="Arial"/>
+                <a:cs typeface="Arial"/>
+                <a:sym typeface="Arial"/>
+                <a:rtl val="0"/>
+              </a:defRPr>
+            </a:lvl8pPr>
+            <a:lvl9pPr marR="0" algn="l" rtl="0">
+              <a:lnSpc>
+                <a:spcPct val="100000"/>
+              </a:lnSpc>
+              <a:spcBef>
+                <a:spcPts val="0"/>
+              </a:spcBef>
+              <a:spcAft>
+                <a:spcPts val="0"/>
+              </a:spcAft>
+              <a:buNone/>
+              <a:defRPr sz="1400" b="0" i="0" u="none" strike="noStrike" cap="none" baseline="0">
+                <a:solidFill>
+                  <a:srgbClr val="000000"/>
+                </a:solidFill>
+                <a:latin typeface="Arial"/>
+                <a:ea typeface="Arial"/>
+                <a:cs typeface="Arial"/>
+                <a:sym typeface="Arial"/>
+                <a:rtl val="0"/>
+              </a:defRPr>
+            </a:lvl9pPr>
+          </a:lstStyle>
+          <a:p>
+            <a:pPr marL="571500" indent="-571500">
+              <a:buFont typeface="Arial" panose="020B0604020202020204" pitchFamily="34" charset="0"/>
+              <a:buChar char="•"/>
+            </a:pPr>
+            <a:r>
+              <a:rPr lang="pt-BR" altLang="pt-BR" sz="2400" kern="0" dirty="0" smtClean="0">
+                <a:latin typeface="Segoe UI Light" panose="020B0502040204020203" pitchFamily="34" charset="0"/>
+                <a:cs typeface="Segoe UI Light" panose="020B0502040204020203" pitchFamily="34" charset="0"/>
+              </a:rPr>
+              <a:t>Listas são um pouco mais flexíveis que vetores. Ao contrário de vetores, listas não precisam que um tamanho limite seja especificado ao definí-las.</a:t>
+            </a:r>
+          </a:p>
+          <a:p>
+            <a:pPr marL="571500" indent="-571500">
+              <a:buFont typeface="Arial" panose="020B0604020202020204" pitchFamily="34" charset="0"/>
+              <a:buChar char="•"/>
+            </a:pPr>
+            <a:endParaRPr lang="pt-BR" altLang="pt-BR" sz="2400" kern="0" dirty="0" smtClean="0">
+              <a:latin typeface="Segoe UI Light" panose="020B0502040204020203" pitchFamily="34" charset="0"/>
+              <a:cs typeface="Segoe UI Light" panose="020B0502040204020203" pitchFamily="34" charset="0"/>
+            </a:endParaRPr>
+          </a:p>
+          <a:p>
+            <a:r>
+              <a:rPr lang="en-US" sz="2400" dirty="0">
+                <a:highlight>
+                  <a:srgbClr val="FFFFFF"/>
+                </a:highlight>
+                <a:latin typeface="Consolas" panose="020B0609020204030204" pitchFamily="49" charset="0"/>
+              </a:rPr>
+              <a:t>            </a:t>
+            </a:r>
+            <a:r>
+              <a:rPr lang="en-US" sz="2400" dirty="0">
+                <a:solidFill>
+                  <a:srgbClr val="2B91AF"/>
+                </a:solidFill>
+                <a:highlight>
+                  <a:srgbClr val="FFFFFF"/>
+                </a:highlight>
+                <a:latin typeface="Consolas" panose="020B0609020204030204" pitchFamily="49" charset="0"/>
+              </a:rPr>
+              <a:t>List</a:t>
+            </a:r>
+            <a:r>
+              <a:rPr lang="en-US" sz="2400" dirty="0">
+                <a:highlight>
+                  <a:srgbClr val="FFFFFF"/>
+                </a:highlight>
+                <a:latin typeface="Consolas" panose="020B0609020204030204" pitchFamily="49" charset="0"/>
+              </a:rPr>
+              <a:t>&lt;</a:t>
+            </a:r>
+            <a:r>
+              <a:rPr lang="en-US" sz="2400" dirty="0">
+                <a:solidFill>
+                  <a:srgbClr val="0000FF"/>
+                </a:solidFill>
+                <a:highlight>
+                  <a:srgbClr val="FFFFFF"/>
+                </a:highlight>
+                <a:latin typeface="Consolas" panose="020B0609020204030204" pitchFamily="49" charset="0"/>
+              </a:rPr>
+              <a:t>string</a:t>
+            </a:r>
+            <a:r>
+              <a:rPr lang="en-US" sz="2400" dirty="0">
+                <a:highlight>
+                  <a:srgbClr val="FFFFFF"/>
+                </a:highlight>
+                <a:latin typeface="Consolas" panose="020B0609020204030204" pitchFamily="49" charset="0"/>
+              </a:rPr>
+              <a:t>&gt; </a:t>
+            </a:r>
+            <a:r>
+              <a:rPr lang="en-US" sz="2400" dirty="0" err="1">
+                <a:highlight>
+                  <a:srgbClr val="FFFFFF"/>
+                </a:highlight>
+                <a:latin typeface="Consolas" panose="020B0609020204030204" pitchFamily="49" charset="0"/>
+              </a:rPr>
+              <a:t>nomesAlunos</a:t>
+            </a:r>
+            <a:r>
+              <a:rPr lang="en-US" sz="2400" dirty="0">
+                <a:highlight>
+                  <a:srgbClr val="FFFFFF"/>
+                </a:highlight>
+                <a:latin typeface="Consolas" panose="020B0609020204030204" pitchFamily="49" charset="0"/>
+              </a:rPr>
+              <a:t> = </a:t>
+            </a:r>
+            <a:r>
+              <a:rPr lang="en-US" sz="2400" dirty="0">
+                <a:solidFill>
+                  <a:srgbClr val="0000FF"/>
+                </a:solidFill>
+                <a:highlight>
+                  <a:srgbClr val="FFFFFF"/>
+                </a:highlight>
+                <a:latin typeface="Consolas" panose="020B0609020204030204" pitchFamily="49" charset="0"/>
+              </a:rPr>
+              <a:t>new</a:t>
+            </a:r>
+            <a:r>
+              <a:rPr lang="en-US" sz="2400" dirty="0">
+                <a:highlight>
+                  <a:srgbClr val="FFFFFF"/>
+                </a:highlight>
+                <a:latin typeface="Consolas" panose="020B0609020204030204" pitchFamily="49" charset="0"/>
+              </a:rPr>
+              <a:t> </a:t>
+            </a:r>
+            <a:r>
+              <a:rPr lang="en-US" sz="2400" dirty="0">
+                <a:solidFill>
+                  <a:srgbClr val="2B91AF"/>
+                </a:solidFill>
+                <a:highlight>
+                  <a:srgbClr val="FFFFFF"/>
+                </a:highlight>
+                <a:latin typeface="Consolas" panose="020B0609020204030204" pitchFamily="49" charset="0"/>
+              </a:rPr>
+              <a:t>List</a:t>
+            </a:r>
+            <a:r>
+              <a:rPr lang="en-US" sz="2400" dirty="0">
+                <a:highlight>
+                  <a:srgbClr val="FFFFFF"/>
+                </a:highlight>
+                <a:latin typeface="Consolas" panose="020B0609020204030204" pitchFamily="49" charset="0"/>
+              </a:rPr>
+              <a:t>&lt;</a:t>
+            </a:r>
+            <a:r>
+              <a:rPr lang="en-US" sz="2400" dirty="0">
+                <a:solidFill>
+                  <a:srgbClr val="0000FF"/>
+                </a:solidFill>
+                <a:highlight>
+                  <a:srgbClr val="FFFFFF"/>
+                </a:highlight>
+                <a:latin typeface="Consolas" panose="020B0609020204030204" pitchFamily="49" charset="0"/>
+              </a:rPr>
+              <a:t>string</a:t>
+            </a:r>
+            <a:r>
+              <a:rPr lang="en-US" sz="2400" dirty="0">
+                <a:highlight>
+                  <a:srgbClr val="FFFFFF"/>
+                </a:highlight>
+                <a:latin typeface="Consolas" panose="020B0609020204030204" pitchFamily="49" charset="0"/>
+              </a:rPr>
+              <a:t>&gt;();</a:t>
+            </a:r>
+          </a:p>
+          <a:p>
+            <a:r>
+              <a:rPr lang="en-US" sz="2400" dirty="0">
+                <a:highlight>
+                  <a:srgbClr val="FFFFFF"/>
+                </a:highlight>
+                <a:latin typeface="Consolas" panose="020B0609020204030204" pitchFamily="49" charset="0"/>
+              </a:rPr>
+              <a:t>            </a:t>
+            </a:r>
+            <a:r>
+              <a:rPr lang="en-US" sz="2400" dirty="0" err="1">
+                <a:highlight>
+                  <a:srgbClr val="FFFFFF"/>
+                </a:highlight>
+                <a:latin typeface="Consolas" panose="020B0609020204030204" pitchFamily="49" charset="0"/>
+              </a:rPr>
+              <a:t>nomesAlunos.Add</a:t>
+            </a:r>
+            <a:r>
+              <a:rPr lang="en-US" sz="2400" dirty="0">
+                <a:highlight>
+                  <a:srgbClr val="FFFFFF"/>
+                </a:highlight>
+                <a:latin typeface="Consolas" panose="020B0609020204030204" pitchFamily="49" charset="0"/>
+              </a:rPr>
+              <a:t>(</a:t>
+            </a:r>
+            <a:r>
+              <a:rPr lang="en-US" sz="2400" dirty="0">
+                <a:solidFill>
+                  <a:srgbClr val="A31515"/>
+                </a:solidFill>
+                <a:highlight>
+                  <a:srgbClr val="FFFFFF"/>
+                </a:highlight>
+                <a:latin typeface="Consolas" panose="020B0609020204030204" pitchFamily="49" charset="0"/>
+              </a:rPr>
+              <a:t>"</a:t>
+            </a:r>
+            <a:r>
+              <a:rPr lang="en-US" sz="2400" dirty="0" err="1">
+                <a:solidFill>
+                  <a:srgbClr val="A31515"/>
+                </a:solidFill>
+                <a:highlight>
+                  <a:srgbClr val="FFFFFF"/>
+                </a:highlight>
+                <a:latin typeface="Consolas" panose="020B0609020204030204" pitchFamily="49" charset="0"/>
+              </a:rPr>
+              <a:t>Guinho</a:t>
+            </a:r>
+            <a:r>
+              <a:rPr lang="en-US" sz="2400" dirty="0">
+                <a:solidFill>
+                  <a:srgbClr val="A31515"/>
+                </a:solidFill>
+                <a:highlight>
+                  <a:srgbClr val="FFFFFF"/>
+                </a:highlight>
+                <a:latin typeface="Consolas" panose="020B0609020204030204" pitchFamily="49" charset="0"/>
+              </a:rPr>
+              <a:t>"</a:t>
+            </a:r>
+            <a:r>
+              <a:rPr lang="en-US" sz="2400" dirty="0">
+                <a:highlight>
+                  <a:srgbClr val="FFFFFF"/>
+                </a:highlight>
+                <a:latin typeface="Consolas" panose="020B0609020204030204" pitchFamily="49" charset="0"/>
+              </a:rPr>
+              <a:t>);</a:t>
+            </a:r>
+          </a:p>
+          <a:p>
+            <a:r>
+              <a:rPr lang="en-US" sz="2400" dirty="0">
+                <a:highlight>
+                  <a:srgbClr val="FFFFFF"/>
+                </a:highlight>
+                <a:latin typeface="Consolas" panose="020B0609020204030204" pitchFamily="49" charset="0"/>
+              </a:rPr>
+              <a:t>            </a:t>
+            </a:r>
+            <a:r>
+              <a:rPr lang="en-US" sz="2400" dirty="0" err="1">
+                <a:highlight>
+                  <a:srgbClr val="FFFFFF"/>
+                </a:highlight>
+                <a:latin typeface="Consolas" panose="020B0609020204030204" pitchFamily="49" charset="0"/>
+              </a:rPr>
+              <a:t>nomesAlunos.Add</a:t>
+            </a:r>
+            <a:r>
+              <a:rPr lang="en-US" sz="2400" dirty="0">
+                <a:highlight>
+                  <a:srgbClr val="FFFFFF"/>
+                </a:highlight>
+                <a:latin typeface="Consolas" panose="020B0609020204030204" pitchFamily="49" charset="0"/>
+              </a:rPr>
+              <a:t>(</a:t>
+            </a:r>
+            <a:r>
+              <a:rPr lang="en-US" sz="2400" dirty="0">
+                <a:solidFill>
+                  <a:srgbClr val="A31515"/>
+                </a:solidFill>
+                <a:highlight>
+                  <a:srgbClr val="FFFFFF"/>
+                </a:highlight>
+                <a:latin typeface="Consolas" panose="020B0609020204030204" pitchFamily="49" charset="0"/>
+              </a:rPr>
+              <a:t>"</a:t>
+            </a:r>
+            <a:r>
+              <a:rPr lang="en-US" sz="2400" dirty="0" err="1">
+                <a:solidFill>
+                  <a:srgbClr val="A31515"/>
+                </a:solidFill>
+                <a:highlight>
+                  <a:srgbClr val="FFFFFF"/>
+                </a:highlight>
+                <a:latin typeface="Consolas" panose="020B0609020204030204" pitchFamily="49" charset="0"/>
+              </a:rPr>
+              <a:t>Zezinho</a:t>
+            </a:r>
+            <a:r>
+              <a:rPr lang="en-US" sz="2400" dirty="0">
+                <a:solidFill>
+                  <a:srgbClr val="A31515"/>
+                </a:solidFill>
+                <a:highlight>
+                  <a:srgbClr val="FFFFFF"/>
+                </a:highlight>
+                <a:latin typeface="Consolas" panose="020B0609020204030204" pitchFamily="49" charset="0"/>
+              </a:rPr>
+              <a:t>"</a:t>
+            </a:r>
+            <a:r>
+              <a:rPr lang="en-US" sz="2400" dirty="0">
+                <a:highlight>
+                  <a:srgbClr val="FFFFFF"/>
+                </a:highlight>
+                <a:latin typeface="Consolas" panose="020B0609020204030204" pitchFamily="49" charset="0"/>
+              </a:rPr>
+              <a:t>);</a:t>
+            </a:r>
+          </a:p>
+          <a:p>
+            <a:r>
+              <a:rPr lang="en-US" sz="2400" dirty="0">
+                <a:highlight>
+                  <a:srgbClr val="FFFFFF"/>
+                </a:highlight>
+                <a:latin typeface="Consolas" panose="020B0609020204030204" pitchFamily="49" charset="0"/>
+              </a:rPr>
+              <a:t>            </a:t>
+            </a:r>
+            <a:r>
+              <a:rPr lang="en-US" sz="2400" dirty="0" err="1">
+                <a:highlight>
+                  <a:srgbClr val="FFFFFF"/>
+                </a:highlight>
+                <a:latin typeface="Consolas" panose="020B0609020204030204" pitchFamily="49" charset="0"/>
+              </a:rPr>
+              <a:t>nomesAlunos.Add</a:t>
+            </a:r>
+            <a:r>
+              <a:rPr lang="en-US" sz="2400" dirty="0">
+                <a:highlight>
+                  <a:srgbClr val="FFFFFF"/>
+                </a:highlight>
+                <a:latin typeface="Consolas" panose="020B0609020204030204" pitchFamily="49" charset="0"/>
+              </a:rPr>
+              <a:t>(</a:t>
+            </a:r>
+            <a:r>
+              <a:rPr lang="en-US" sz="2400" dirty="0">
+                <a:solidFill>
+                  <a:srgbClr val="A31515"/>
+                </a:solidFill>
+                <a:highlight>
+                  <a:srgbClr val="FFFFFF"/>
+                </a:highlight>
+                <a:latin typeface="Consolas" panose="020B0609020204030204" pitchFamily="49" charset="0"/>
+              </a:rPr>
+              <a:t>"</a:t>
+            </a:r>
+            <a:r>
+              <a:rPr lang="en-US" sz="2400" dirty="0" err="1">
+                <a:solidFill>
+                  <a:srgbClr val="A31515"/>
+                </a:solidFill>
+                <a:highlight>
+                  <a:srgbClr val="FFFFFF"/>
+                </a:highlight>
+                <a:latin typeface="Consolas" panose="020B0609020204030204" pitchFamily="49" charset="0"/>
+              </a:rPr>
+              <a:t>Luizinho</a:t>
+            </a:r>
+            <a:r>
+              <a:rPr lang="en-US" sz="2400" dirty="0">
+                <a:solidFill>
+                  <a:srgbClr val="A31515"/>
+                </a:solidFill>
+                <a:highlight>
+                  <a:srgbClr val="FFFFFF"/>
+                </a:highlight>
+                <a:latin typeface="Consolas" panose="020B0609020204030204" pitchFamily="49" charset="0"/>
+              </a:rPr>
+              <a:t>"</a:t>
+            </a:r>
+            <a:r>
+              <a:rPr lang="en-US" sz="2400" dirty="0">
+                <a:highlight>
+                  <a:srgbClr val="FFFFFF"/>
+                </a:highlight>
+                <a:latin typeface="Consolas" panose="020B0609020204030204" pitchFamily="49" charset="0"/>
+              </a:rPr>
+              <a:t>);</a:t>
+            </a:r>
+          </a:p>
+          <a:p>
+            <a:endParaRPr lang="en-US" sz="2400" dirty="0">
+              <a:highlight>
+                <a:srgbClr val="FFFFFF"/>
+              </a:highlight>
+              <a:latin typeface="Consolas" panose="020B0609020204030204" pitchFamily="49" charset="0"/>
+            </a:endParaRPr>
+          </a:p>
+          <a:p>
+            <a:r>
+              <a:rPr lang="en-US" sz="2400" dirty="0">
+                <a:highlight>
+                  <a:srgbClr val="FFFFFF"/>
+                </a:highlight>
+                <a:latin typeface="Consolas" panose="020B0609020204030204" pitchFamily="49" charset="0"/>
+              </a:rPr>
+              <a:t>            </a:t>
+            </a:r>
+            <a:r>
+              <a:rPr lang="en-US" sz="2400" dirty="0" err="1">
+                <a:solidFill>
+                  <a:srgbClr val="0000FF"/>
+                </a:solidFill>
+                <a:highlight>
+                  <a:srgbClr val="FFFFFF"/>
+                </a:highlight>
+                <a:latin typeface="Consolas" panose="020B0609020204030204" pitchFamily="49" charset="0"/>
+              </a:rPr>
+              <a:t>foreach</a:t>
+            </a:r>
+            <a:r>
+              <a:rPr lang="en-US" sz="2400" dirty="0">
+                <a:highlight>
+                  <a:srgbClr val="FFFFFF"/>
+                </a:highlight>
+                <a:latin typeface="Consolas" panose="020B0609020204030204" pitchFamily="49" charset="0"/>
+              </a:rPr>
+              <a:t> (</a:t>
+            </a:r>
+            <a:r>
+              <a:rPr lang="en-US" sz="2400" dirty="0">
+                <a:solidFill>
+                  <a:srgbClr val="0000FF"/>
+                </a:solidFill>
+                <a:highlight>
+                  <a:srgbClr val="FFFFFF"/>
+                </a:highlight>
+                <a:latin typeface="Consolas" panose="020B0609020204030204" pitchFamily="49" charset="0"/>
+              </a:rPr>
+              <a:t>string</a:t>
+            </a:r>
+            <a:r>
+              <a:rPr lang="en-US" sz="2400" dirty="0">
+                <a:highlight>
+                  <a:srgbClr val="FFFFFF"/>
+                </a:highlight>
+                <a:latin typeface="Consolas" panose="020B0609020204030204" pitchFamily="49" charset="0"/>
+              </a:rPr>
+              <a:t> </a:t>
+            </a:r>
+            <a:r>
+              <a:rPr lang="en-US" sz="2400" dirty="0" err="1">
+                <a:highlight>
+                  <a:srgbClr val="FFFFFF"/>
+                </a:highlight>
+                <a:latin typeface="Consolas" panose="020B0609020204030204" pitchFamily="49" charset="0"/>
+              </a:rPr>
+              <a:t>nome</a:t>
+            </a:r>
+            <a:r>
+              <a:rPr lang="en-US" sz="2400" dirty="0">
+                <a:highlight>
+                  <a:srgbClr val="FFFFFF"/>
+                </a:highlight>
+                <a:latin typeface="Consolas" panose="020B0609020204030204" pitchFamily="49" charset="0"/>
+              </a:rPr>
+              <a:t> </a:t>
+            </a:r>
+            <a:r>
+              <a:rPr lang="en-US" sz="2400" dirty="0">
+                <a:solidFill>
+                  <a:srgbClr val="0000FF"/>
+                </a:solidFill>
+                <a:highlight>
+                  <a:srgbClr val="FFFFFF"/>
+                </a:highlight>
+                <a:latin typeface="Consolas" panose="020B0609020204030204" pitchFamily="49" charset="0"/>
+              </a:rPr>
+              <a:t>in</a:t>
+            </a:r>
+            <a:r>
+              <a:rPr lang="en-US" sz="2400" dirty="0">
+                <a:highlight>
+                  <a:srgbClr val="FFFFFF"/>
+                </a:highlight>
+                <a:latin typeface="Consolas" panose="020B0609020204030204" pitchFamily="49" charset="0"/>
+              </a:rPr>
+              <a:t> </a:t>
+            </a:r>
+            <a:r>
+              <a:rPr lang="en-US" sz="2400" dirty="0" err="1">
+                <a:highlight>
+                  <a:srgbClr val="FFFFFF"/>
+                </a:highlight>
+                <a:latin typeface="Consolas" panose="020B0609020204030204" pitchFamily="49" charset="0"/>
+              </a:rPr>
+              <a:t>nomesAlunos</a:t>
+            </a:r>
+            <a:r>
+              <a:rPr lang="en-US" sz="2400" dirty="0">
+                <a:highlight>
+                  <a:srgbClr val="FFFFFF"/>
+                </a:highlight>
+                <a:latin typeface="Consolas" panose="020B0609020204030204" pitchFamily="49" charset="0"/>
+              </a:rPr>
+              <a:t>)</a:t>
+            </a:r>
+          </a:p>
+          <a:p>
+            <a:r>
+              <a:rPr lang="en-US" sz="2400" dirty="0">
+                <a:highlight>
+                  <a:srgbClr val="FFFFFF"/>
+                </a:highlight>
+                <a:latin typeface="Consolas" panose="020B0609020204030204" pitchFamily="49" charset="0"/>
+              </a:rPr>
+              <a:t>            {</a:t>
+            </a:r>
+          </a:p>
+          <a:p>
+            <a:r>
+              <a:rPr lang="en-US" sz="2400" dirty="0">
+                <a:highlight>
+                  <a:srgbClr val="FFFFFF"/>
+                </a:highlight>
+                <a:latin typeface="Consolas" panose="020B0609020204030204" pitchFamily="49" charset="0"/>
+              </a:rPr>
+              <a:t>                </a:t>
+            </a:r>
+            <a:r>
+              <a:rPr lang="en-US" sz="2400" dirty="0" err="1">
+                <a:solidFill>
+                  <a:srgbClr val="2B91AF"/>
+                </a:solidFill>
+                <a:highlight>
+                  <a:srgbClr val="FFFFFF"/>
+                </a:highlight>
+                <a:latin typeface="Consolas" panose="020B0609020204030204" pitchFamily="49" charset="0"/>
+              </a:rPr>
+              <a:t>Console</a:t>
+            </a:r>
+            <a:r>
+              <a:rPr lang="en-US" sz="2400" dirty="0" err="1">
+                <a:highlight>
+                  <a:srgbClr val="FFFFFF"/>
+                </a:highlight>
+                <a:latin typeface="Consolas" panose="020B0609020204030204" pitchFamily="49" charset="0"/>
+              </a:rPr>
+              <a:t>.WriteLine</a:t>
+            </a:r>
+            <a:r>
+              <a:rPr lang="en-US" sz="2400" dirty="0">
+                <a:highlight>
+                  <a:srgbClr val="FFFFFF"/>
+                </a:highlight>
+                <a:latin typeface="Consolas" panose="020B0609020204030204" pitchFamily="49" charset="0"/>
+              </a:rPr>
+              <a:t>(</a:t>
+            </a:r>
+            <a:r>
+              <a:rPr lang="en-US" sz="2400" dirty="0" err="1">
+                <a:highlight>
+                  <a:srgbClr val="FFFFFF"/>
+                </a:highlight>
+                <a:latin typeface="Consolas" panose="020B0609020204030204" pitchFamily="49" charset="0"/>
+              </a:rPr>
+              <a:t>nome</a:t>
+            </a:r>
+            <a:r>
+              <a:rPr lang="en-US" sz="2400" dirty="0">
+                <a:highlight>
+                  <a:srgbClr val="FFFFFF"/>
+                </a:highlight>
+                <a:latin typeface="Consolas" panose="020B0609020204030204" pitchFamily="49" charset="0"/>
+              </a:rPr>
+              <a:t>);</a:t>
+            </a:r>
+          </a:p>
+          <a:p>
+            <a:r>
+              <a:rPr lang="en-US" sz="2400" dirty="0">
+                <a:highlight>
+                  <a:srgbClr val="FFFFFF"/>
+                </a:highlight>
+                <a:latin typeface="Consolas" panose="020B0609020204030204" pitchFamily="49" charset="0"/>
+              </a:rPr>
+              <a:t>            }</a:t>
+            </a:r>
+            <a:endParaRPr lang="pt-BR" altLang="pt-BR" sz="2400" kern="0" dirty="0" smtClean="0">
+              <a:latin typeface="Segoe UI Light" panose="020B0502040204020203" pitchFamily="34" charset="0"/>
+              <a:cs typeface="Segoe UI Light" panose="020B0502040204020203" pitchFamily="34" charset="0"/>
+            </a:endParaRPr>
+          </a:p>
+        </p:txBody>
+      </p:sp>
+    </p:spTree>
+    <p:custDataLst>
+      <p:tags r:id="rId1"/>
+    </p:custDataLst>
+    <p:extLst>
+      <p:ext uri="{BB962C8B-B14F-4D97-AF65-F5344CB8AC3E}">
+        <p14:creationId xmlns:p14="http://schemas.microsoft.com/office/powerpoint/2010/main" val="2285803617"/>
       </p:ext>
     </p:extLst>
   </p:cSld>

</xml_diff>